<commit_message>
Update Globalizing Your ASP.NET 8 Presence.pptx
</commit_message>
<xml_diff>
--- a/Globalizing Your ASP.NET 8 Presence.pptx
+++ b/Globalizing Your ASP.NET 8 Presence.pptx
@@ -21,17 +21,16 @@
     <p:sldId id="269" r:id="rId15"/>
     <p:sldId id="271" r:id="rId16"/>
     <p:sldId id="272" r:id="rId17"/>
-    <p:sldId id="273" r:id="rId18"/>
-    <p:sldId id="274" r:id="rId19"/>
-    <p:sldId id="278" r:id="rId20"/>
-    <p:sldId id="275" r:id="rId21"/>
-    <p:sldId id="276" r:id="rId22"/>
+    <p:sldId id="284" r:id="rId18"/>
+    <p:sldId id="273" r:id="rId19"/>
+    <p:sldId id="274" r:id="rId20"/>
+    <p:sldId id="278" r:id="rId21"/>
+    <p:sldId id="275" r:id="rId22"/>
     <p:sldId id="277" r:id="rId23"/>
     <p:sldId id="279" r:id="rId24"/>
     <p:sldId id="280" r:id="rId25"/>
-    <p:sldId id="281" r:id="rId26"/>
-    <p:sldId id="282" r:id="rId27"/>
-    <p:sldId id="283" r:id="rId28"/>
+    <p:sldId id="282" r:id="rId26"/>
+    <p:sldId id="283" r:id="rId27"/>
   </p:sldIdLst>
   <p:sldSz cx="12192000" cy="6858000"/>
   <p:notesSz cx="6858000" cy="9144000"/>
@@ -4421,6 +4420,466 @@
           <a:chExt cx="0" cy="0"/>
         </a:xfrm>
       </p:grpSpPr>
+      <p:sp>
+        <p:nvSpPr>
+          <p:cNvPr id="5" name="TextBox 4">
+            <a:extLst>
+              <a:ext uri="{FF2B5EF4-FFF2-40B4-BE49-F238E27FC236}">
+                <a16:creationId xmlns:a16="http://schemas.microsoft.com/office/drawing/2014/main" id="{1401166C-CE0B-2AC3-79C0-7EF8D5063C8B}"/>
+              </a:ext>
+            </a:extLst>
+          </p:cNvPr>
+          <p:cNvSpPr txBox="1"/>
+          <p:nvPr/>
+        </p:nvSpPr>
+        <p:spPr>
+          <a:xfrm>
+            <a:off x="588333" y="1705451"/>
+            <a:ext cx="11270513" cy="3447098"/>
+          </a:xfrm>
+          <a:prstGeom prst="rect">
+            <a:avLst/>
+          </a:prstGeom>
+          <a:noFill/>
+        </p:spPr>
+        <p:txBody>
+          <a:bodyPr wrap="square">
+            <a:spAutoFit/>
+          </a:bodyPr>
+          <a:lstStyle/>
+          <a:p>
+            <a:pPr marL="0" indent="0">
+              <a:buNone/>
+            </a:pPr>
+            <a:r>
+              <a:rPr lang="en-US" sz="2000" dirty="0">
+                <a:solidFill>
+                  <a:srgbClr val="569CD6"/>
+                </a:solidFill>
+                <a:latin typeface="Hack" panose="020B0609030202020204" pitchFamily="49" charset="0"/>
+                <a:ea typeface="Hack" panose="020B0609030202020204" pitchFamily="49" charset="0"/>
+                <a:cs typeface="Hack" panose="020B0609030202020204" pitchFamily="49" charset="0"/>
+              </a:rPr>
+              <a:t>public</a:t>
+            </a:r>
+            <a:r>
+              <a:rPr lang="en-US" sz="2000" dirty="0">
+                <a:solidFill>
+                  <a:srgbClr val="D4D4D4"/>
+                </a:solidFill>
+                <a:latin typeface="Hack" panose="020B0609030202020204" pitchFamily="49" charset="0"/>
+                <a:ea typeface="Hack" panose="020B0609030202020204" pitchFamily="49" charset="0"/>
+                <a:cs typeface="Hack" panose="020B0609030202020204" pitchFamily="49" charset="0"/>
+              </a:rPr>
+              <a:t> </a:t>
+            </a:r>
+            <a:r>
+              <a:rPr lang="en-US" sz="2000" dirty="0">
+                <a:solidFill>
+                  <a:srgbClr val="569CD6"/>
+                </a:solidFill>
+                <a:latin typeface="Hack" panose="020B0609030202020204" pitchFamily="49" charset="0"/>
+                <a:ea typeface="Hack" panose="020B0609030202020204" pitchFamily="49" charset="0"/>
+                <a:cs typeface="Hack" panose="020B0609030202020204" pitchFamily="49" charset="0"/>
+              </a:rPr>
+              <a:t>class</a:t>
+            </a:r>
+            <a:r>
+              <a:rPr lang="en-US" sz="2000" dirty="0">
+                <a:solidFill>
+                  <a:srgbClr val="D4D4D4"/>
+                </a:solidFill>
+                <a:latin typeface="Hack" panose="020B0609030202020204" pitchFamily="49" charset="0"/>
+                <a:ea typeface="Hack" panose="020B0609030202020204" pitchFamily="49" charset="0"/>
+                <a:cs typeface="Hack" panose="020B0609030202020204" pitchFamily="49" charset="0"/>
+              </a:rPr>
+              <a:t> </a:t>
+            </a:r>
+            <a:r>
+              <a:rPr lang="en-US" sz="2000" dirty="0" err="1">
+                <a:solidFill>
+                  <a:srgbClr val="4EC9B0"/>
+                </a:solidFill>
+                <a:latin typeface="Hack" panose="020B0609030202020204" pitchFamily="49" charset="0"/>
+                <a:ea typeface="Hack" panose="020B0609030202020204" pitchFamily="49" charset="0"/>
+                <a:cs typeface="Hack" panose="020B0609030202020204" pitchFamily="49" charset="0"/>
+              </a:rPr>
+              <a:t>HomeController</a:t>
+            </a:r>
+            <a:r>
+              <a:rPr lang="en-US" sz="2000" dirty="0">
+                <a:solidFill>
+                  <a:srgbClr val="D4D4D4"/>
+                </a:solidFill>
+                <a:latin typeface="Hack" panose="020B0609030202020204" pitchFamily="49" charset="0"/>
+                <a:ea typeface="Hack" panose="020B0609030202020204" pitchFamily="49" charset="0"/>
+                <a:cs typeface="Hack" panose="020B0609030202020204" pitchFamily="49" charset="0"/>
+              </a:rPr>
+              <a:t> : </a:t>
+            </a:r>
+            <a:r>
+              <a:rPr lang="en-US" sz="2000" dirty="0">
+                <a:solidFill>
+                  <a:srgbClr val="4EC9B0"/>
+                </a:solidFill>
+                <a:latin typeface="Hack" panose="020B0609030202020204" pitchFamily="49" charset="0"/>
+                <a:ea typeface="Hack" panose="020B0609030202020204" pitchFamily="49" charset="0"/>
+                <a:cs typeface="Hack" panose="020B0609030202020204" pitchFamily="49" charset="0"/>
+              </a:rPr>
+              <a:t>Controller</a:t>
+            </a:r>
+            <a:r>
+              <a:rPr lang="en-US" sz="2000" dirty="0">
+                <a:solidFill>
+                  <a:srgbClr val="D4D4D4"/>
+                </a:solidFill>
+                <a:latin typeface="Hack" panose="020B0609030202020204" pitchFamily="49" charset="0"/>
+                <a:ea typeface="Hack" panose="020B0609030202020204" pitchFamily="49" charset="0"/>
+                <a:cs typeface="Hack" panose="020B0609030202020204" pitchFamily="49" charset="0"/>
+              </a:rPr>
+              <a:t> </a:t>
+            </a:r>
+            <a:r>
+              <a:rPr lang="en-US" sz="2000" dirty="0">
+                <a:solidFill>
+                  <a:schemeClr val="accent6"/>
+                </a:solidFill>
+                <a:latin typeface="Hack" panose="020B0609030202020204" pitchFamily="49" charset="0"/>
+                <a:ea typeface="Hack" panose="020B0609030202020204" pitchFamily="49" charset="0"/>
+                <a:cs typeface="Hack" panose="020B0609030202020204" pitchFamily="49" charset="0"/>
+              </a:rPr>
+              <a:t>{</a:t>
+            </a:r>
+          </a:p>
+          <a:p>
+            <a:pPr marL="0" indent="0">
+              <a:buNone/>
+            </a:pPr>
+            <a:r>
+              <a:rPr lang="en-US" sz="2000" dirty="0">
+                <a:solidFill>
+                  <a:srgbClr val="569CD6"/>
+                </a:solidFill>
+                <a:latin typeface="Hack" panose="020B0609030202020204" pitchFamily="49" charset="0"/>
+                <a:ea typeface="Hack" panose="020B0609030202020204" pitchFamily="49" charset="0"/>
+                <a:cs typeface="Hack" panose="020B0609030202020204" pitchFamily="49" charset="0"/>
+              </a:rPr>
+              <a:t>	private</a:t>
+            </a:r>
+            <a:r>
+              <a:rPr lang="en-US" sz="2000" dirty="0">
+                <a:solidFill>
+                  <a:srgbClr val="D4D4D4"/>
+                </a:solidFill>
+                <a:latin typeface="Hack" panose="020B0609030202020204" pitchFamily="49" charset="0"/>
+                <a:ea typeface="Hack" panose="020B0609030202020204" pitchFamily="49" charset="0"/>
+                <a:cs typeface="Hack" panose="020B0609030202020204" pitchFamily="49" charset="0"/>
+              </a:rPr>
+              <a:t> </a:t>
+            </a:r>
+            <a:r>
+              <a:rPr lang="en-US" sz="2000" dirty="0" err="1">
+                <a:solidFill>
+                  <a:srgbClr val="569CD6"/>
+                </a:solidFill>
+                <a:latin typeface="Hack" panose="020B0609030202020204" pitchFamily="49" charset="0"/>
+                <a:ea typeface="Hack" panose="020B0609030202020204" pitchFamily="49" charset="0"/>
+                <a:cs typeface="Hack" panose="020B0609030202020204" pitchFamily="49" charset="0"/>
+              </a:rPr>
+              <a:t>readonly</a:t>
+            </a:r>
+            <a:r>
+              <a:rPr lang="en-US" sz="2000" dirty="0">
+                <a:solidFill>
+                  <a:srgbClr val="D4D4D4"/>
+                </a:solidFill>
+                <a:latin typeface="Hack" panose="020B0609030202020204" pitchFamily="49" charset="0"/>
+                <a:ea typeface="Hack" panose="020B0609030202020204" pitchFamily="49" charset="0"/>
+                <a:cs typeface="Hack" panose="020B0609030202020204" pitchFamily="49" charset="0"/>
+              </a:rPr>
+              <a:t> </a:t>
+            </a:r>
+            <a:r>
+              <a:rPr lang="en-US" sz="2000" dirty="0" err="1">
+                <a:solidFill>
+                  <a:srgbClr val="4EC9B0"/>
+                </a:solidFill>
+                <a:latin typeface="Hack" panose="020B0609030202020204" pitchFamily="49" charset="0"/>
+                <a:ea typeface="Hack" panose="020B0609030202020204" pitchFamily="49" charset="0"/>
+                <a:cs typeface="Hack" panose="020B0609030202020204" pitchFamily="49" charset="0"/>
+              </a:rPr>
+              <a:t>IHtmlStringLocalizer</a:t>
+            </a:r>
+            <a:r>
+              <a:rPr lang="en-US" sz="2000" dirty="0">
+                <a:solidFill>
+                  <a:schemeClr val="accent6"/>
+                </a:solidFill>
+                <a:latin typeface="Hack" panose="020B0609030202020204" pitchFamily="49" charset="0"/>
+                <a:ea typeface="Hack" panose="020B0609030202020204" pitchFamily="49" charset="0"/>
+                <a:cs typeface="Hack" panose="020B0609030202020204" pitchFamily="49" charset="0"/>
+              </a:rPr>
+              <a:t>&lt;</a:t>
+            </a:r>
+            <a:r>
+              <a:rPr lang="en-US" sz="2000" dirty="0" err="1">
+                <a:solidFill>
+                  <a:srgbClr val="4EC9B0"/>
+                </a:solidFill>
+                <a:latin typeface="Hack" panose="020B0609030202020204" pitchFamily="49" charset="0"/>
+                <a:ea typeface="Hack" panose="020B0609030202020204" pitchFamily="49" charset="0"/>
+                <a:cs typeface="Hack" panose="020B0609030202020204" pitchFamily="49" charset="0"/>
+              </a:rPr>
+              <a:t>HomeController</a:t>
+            </a:r>
+            <a:r>
+              <a:rPr lang="en-US" sz="2000" dirty="0">
+                <a:solidFill>
+                  <a:schemeClr val="accent6"/>
+                </a:solidFill>
+                <a:latin typeface="Hack" panose="020B0609030202020204" pitchFamily="49" charset="0"/>
+                <a:ea typeface="Hack" panose="020B0609030202020204" pitchFamily="49" charset="0"/>
+                <a:cs typeface="Hack" panose="020B0609030202020204" pitchFamily="49" charset="0"/>
+              </a:rPr>
+              <a:t>&gt; _localizer;</a:t>
+            </a:r>
+          </a:p>
+          <a:p>
+            <a:pPr marL="0" indent="0">
+              <a:buNone/>
+            </a:pPr>
+            <a:br>
+              <a:rPr lang="en-US" sz="2000" dirty="0">
+                <a:solidFill>
+                  <a:srgbClr val="D4D4D4"/>
+                </a:solidFill>
+                <a:latin typeface="Hack" panose="020B0609030202020204" pitchFamily="49" charset="0"/>
+                <a:ea typeface="Hack" panose="020B0609030202020204" pitchFamily="49" charset="0"/>
+                <a:cs typeface="Hack" panose="020B0609030202020204" pitchFamily="49" charset="0"/>
+              </a:rPr>
+            </a:br>
+            <a:r>
+              <a:rPr lang="en-US" sz="2000" dirty="0">
+                <a:solidFill>
+                  <a:srgbClr val="D4D4D4"/>
+                </a:solidFill>
+                <a:latin typeface="Hack" panose="020B0609030202020204" pitchFamily="49" charset="0"/>
+                <a:ea typeface="Hack" panose="020B0609030202020204" pitchFamily="49" charset="0"/>
+                <a:cs typeface="Hack" panose="020B0609030202020204" pitchFamily="49" charset="0"/>
+              </a:rPr>
+              <a:t>	</a:t>
+            </a:r>
+            <a:r>
+              <a:rPr lang="en-US" sz="2000" dirty="0">
+                <a:solidFill>
+                  <a:srgbClr val="569CD6"/>
+                </a:solidFill>
+                <a:latin typeface="Hack" panose="020B0609030202020204" pitchFamily="49" charset="0"/>
+                <a:ea typeface="Hack" panose="020B0609030202020204" pitchFamily="49" charset="0"/>
+                <a:cs typeface="Hack" panose="020B0609030202020204" pitchFamily="49" charset="0"/>
+              </a:rPr>
+              <a:t>public </a:t>
+            </a:r>
+            <a:r>
+              <a:rPr lang="en-US" sz="2000" dirty="0" err="1">
+                <a:solidFill>
+                  <a:srgbClr val="908E3A"/>
+                </a:solidFill>
+                <a:latin typeface="Hack" panose="020B0609030202020204" pitchFamily="49" charset="0"/>
+                <a:ea typeface="Hack" panose="020B0609030202020204" pitchFamily="49" charset="0"/>
+                <a:cs typeface="Hack" panose="020B0609030202020204" pitchFamily="49" charset="0"/>
+              </a:rPr>
+              <a:t>HomeController</a:t>
+            </a:r>
+            <a:r>
+              <a:rPr lang="en-US" sz="2000" dirty="0">
+                <a:solidFill>
+                  <a:schemeClr val="accent6"/>
+                </a:solidFill>
+                <a:latin typeface="Hack" panose="020B0609030202020204" pitchFamily="49" charset="0"/>
+                <a:ea typeface="Hack" panose="020B0609030202020204" pitchFamily="49" charset="0"/>
+                <a:cs typeface="Hack" panose="020B0609030202020204" pitchFamily="49" charset="0"/>
+              </a:rPr>
+              <a:t>(</a:t>
+            </a:r>
+          </a:p>
+          <a:p>
+            <a:pPr marL="0" indent="0">
+              <a:buNone/>
+            </a:pPr>
+            <a:r>
+              <a:rPr lang="en-US" sz="2000" dirty="0">
+                <a:solidFill>
+                  <a:srgbClr val="D4D4D4"/>
+                </a:solidFill>
+                <a:latin typeface="Hack" panose="020B0609030202020204" pitchFamily="49" charset="0"/>
+                <a:ea typeface="Hack" panose="020B0609030202020204" pitchFamily="49" charset="0"/>
+                <a:cs typeface="Hack" panose="020B0609030202020204" pitchFamily="49" charset="0"/>
+              </a:rPr>
+              <a:t>		</a:t>
+            </a:r>
+            <a:r>
+              <a:rPr lang="en-US" sz="2000" dirty="0" err="1">
+                <a:solidFill>
+                  <a:srgbClr val="4EC9B0"/>
+                </a:solidFill>
+                <a:latin typeface="Hack" panose="020B0609030202020204" pitchFamily="49" charset="0"/>
+                <a:ea typeface="Hack" panose="020B0609030202020204" pitchFamily="49" charset="0"/>
+                <a:cs typeface="Hack" panose="020B0609030202020204" pitchFamily="49" charset="0"/>
+              </a:rPr>
+              <a:t>IStringLocalizer</a:t>
+            </a:r>
+            <a:r>
+              <a:rPr lang="en-US" sz="2000" dirty="0">
+                <a:solidFill>
+                  <a:schemeClr val="accent6"/>
+                </a:solidFill>
+                <a:latin typeface="Hack" panose="020B0609030202020204" pitchFamily="49" charset="0"/>
+                <a:ea typeface="Hack" panose="020B0609030202020204" pitchFamily="49" charset="0"/>
+                <a:cs typeface="Hack" panose="020B0609030202020204" pitchFamily="49" charset="0"/>
+              </a:rPr>
+              <a:t>&lt;</a:t>
+            </a:r>
+            <a:r>
+              <a:rPr lang="en-US" sz="2000" dirty="0" err="1">
+                <a:solidFill>
+                  <a:srgbClr val="4EC9B0"/>
+                </a:solidFill>
+                <a:latin typeface="Hack" panose="020B0609030202020204" pitchFamily="49" charset="0"/>
+                <a:ea typeface="Hack" panose="020B0609030202020204" pitchFamily="49" charset="0"/>
+                <a:cs typeface="Hack" panose="020B0609030202020204" pitchFamily="49" charset="0"/>
+              </a:rPr>
+              <a:t>HomeController</a:t>
+            </a:r>
+            <a:r>
+              <a:rPr lang="en-US" sz="2000" dirty="0">
+                <a:solidFill>
+                  <a:schemeClr val="accent6"/>
+                </a:solidFill>
+                <a:latin typeface="Hack" panose="020B0609030202020204" pitchFamily="49" charset="0"/>
+                <a:ea typeface="Hack" panose="020B0609030202020204" pitchFamily="49" charset="0"/>
+                <a:cs typeface="Hack" panose="020B0609030202020204" pitchFamily="49" charset="0"/>
+              </a:rPr>
+              <a:t>&gt; localizer</a:t>
+            </a:r>
+          </a:p>
+          <a:p>
+            <a:pPr marL="0" indent="0">
+              <a:buNone/>
+            </a:pPr>
+            <a:r>
+              <a:rPr lang="en-US" sz="2000" dirty="0">
+                <a:solidFill>
+                  <a:schemeClr val="accent6"/>
+                </a:solidFill>
+                <a:latin typeface="Hack" panose="020B0609030202020204" pitchFamily="49" charset="0"/>
+                <a:ea typeface="Hack" panose="020B0609030202020204" pitchFamily="49" charset="0"/>
+                <a:cs typeface="Hack" panose="020B0609030202020204" pitchFamily="49" charset="0"/>
+              </a:rPr>
+              <a:t>		)</a:t>
+            </a:r>
+          </a:p>
+          <a:p>
+            <a:pPr marL="0" indent="0">
+              <a:buNone/>
+            </a:pPr>
+            <a:r>
+              <a:rPr lang="en-US" sz="2000" dirty="0">
+                <a:solidFill>
+                  <a:schemeClr val="accent6"/>
+                </a:solidFill>
+                <a:latin typeface="Hack" panose="020B0609030202020204" pitchFamily="49" charset="0"/>
+                <a:ea typeface="Hack" panose="020B0609030202020204" pitchFamily="49" charset="0"/>
+                <a:cs typeface="Hack" panose="020B0609030202020204" pitchFamily="49" charset="0"/>
+              </a:rPr>
+              <a:t>	{</a:t>
+            </a:r>
+          </a:p>
+          <a:p>
+            <a:pPr marL="0" indent="0">
+              <a:buNone/>
+            </a:pPr>
+            <a:r>
+              <a:rPr lang="en-US" sz="2000" dirty="0">
+                <a:solidFill>
+                  <a:srgbClr val="9CDCFE"/>
+                </a:solidFill>
+                <a:latin typeface="Hack" panose="020B0609030202020204" pitchFamily="49" charset="0"/>
+                <a:ea typeface="Hack" panose="020B0609030202020204" pitchFamily="49" charset="0"/>
+                <a:cs typeface="Hack" panose="020B0609030202020204" pitchFamily="49" charset="0"/>
+              </a:rPr>
+              <a:t>		</a:t>
+            </a:r>
+            <a:r>
+              <a:rPr lang="en-US" sz="2000" dirty="0">
+                <a:solidFill>
+                  <a:schemeClr val="accent2">
+                    <a:lumMod val="60000"/>
+                    <a:lumOff val="40000"/>
+                  </a:schemeClr>
+                </a:solidFill>
+                <a:latin typeface="Hack" panose="020B0609030202020204" pitchFamily="49" charset="0"/>
+                <a:ea typeface="Hack" panose="020B0609030202020204" pitchFamily="49" charset="0"/>
+                <a:cs typeface="Hack" panose="020B0609030202020204" pitchFamily="49" charset="0"/>
+              </a:rPr>
+              <a:t>_localizer = localizer</a:t>
+            </a:r>
+            <a:r>
+              <a:rPr lang="en-US" sz="2000" dirty="0">
+                <a:solidFill>
+                  <a:schemeClr val="accent6"/>
+                </a:solidFill>
+                <a:latin typeface="Hack" panose="020B0609030202020204" pitchFamily="49" charset="0"/>
+                <a:ea typeface="Hack" panose="020B0609030202020204" pitchFamily="49" charset="0"/>
+                <a:cs typeface="Hack" panose="020B0609030202020204" pitchFamily="49" charset="0"/>
+              </a:rPr>
+              <a:t>;</a:t>
+            </a:r>
+          </a:p>
+          <a:p>
+            <a:pPr marL="0" indent="0">
+              <a:buNone/>
+            </a:pPr>
+            <a:r>
+              <a:rPr lang="en-US" sz="2000" dirty="0">
+                <a:solidFill>
+                  <a:schemeClr val="accent6"/>
+                </a:solidFill>
+                <a:latin typeface="Hack" panose="020B0609030202020204" pitchFamily="49" charset="0"/>
+                <a:ea typeface="Hack" panose="020B0609030202020204" pitchFamily="49" charset="0"/>
+                <a:cs typeface="Hack" panose="020B0609030202020204" pitchFamily="49" charset="0"/>
+              </a:rPr>
+              <a:t>	}</a:t>
+            </a:r>
+          </a:p>
+          <a:p>
+            <a:pPr marL="0" indent="0">
+              <a:buNone/>
+            </a:pPr>
+            <a:r>
+              <a:rPr lang="en-US" sz="2000" dirty="0">
+                <a:solidFill>
+                  <a:schemeClr val="accent6"/>
+                </a:solidFill>
+                <a:latin typeface="Hack" panose="020B0609030202020204" pitchFamily="49" charset="0"/>
+                <a:ea typeface="Hack" panose="020B0609030202020204" pitchFamily="49" charset="0"/>
+                <a:cs typeface="Hack" panose="020B0609030202020204" pitchFamily="49" charset="0"/>
+              </a:rPr>
+              <a:t>}</a:t>
+            </a:r>
+          </a:p>
+          <a:p>
+            <a:pPr marL="0" indent="0">
+              <a:buNone/>
+            </a:pPr>
+            <a:endParaRPr lang="en-US" sz="1800" dirty="0">
+              <a:latin typeface="Hack" panose="020B0609030202020204" pitchFamily="49" charset="0"/>
+              <a:ea typeface="Hack" panose="020B0609030202020204" pitchFamily="49" charset="0"/>
+              <a:cs typeface="Hack" panose="020B0609030202020204" pitchFamily="49" charset="0"/>
+            </a:endParaRPr>
+          </a:p>
+        </p:txBody>
+      </p:sp>
     </p:spTree>
     <p:extLst>
       <p:ext uri="{BB962C8B-B14F-4D97-AF65-F5344CB8AC3E}">
@@ -4495,12 +4954,178 @@
             <p:ph idx="1"/>
           </p:nvPr>
         </p:nvSpPr>
-        <p:spPr/>
-        <p:txBody>
-          <a:bodyPr/>
+        <p:spPr>
+          <a:xfrm>
+            <a:off x="1638300" y="2057400"/>
+            <a:ext cx="8915402" cy="4641112"/>
+          </a:xfrm>
+        </p:spPr>
+        <p:txBody>
+          <a:bodyPr>
+            <a:normAutofit/>
+          </a:bodyPr>
           <a:lstStyle/>
           <a:p>
-            <a:endParaRPr lang="en-US"/>
+            <a:pPr marL="0" indent="0">
+              <a:buNone/>
+            </a:pPr>
+            <a:r>
+              <a:rPr lang="en-US" sz="2800" dirty="0">
+                <a:solidFill>
+                  <a:schemeClr val="accent2"/>
+                </a:solidFill>
+              </a:rPr>
+              <a:t>Resources/</a:t>
+            </a:r>
+            <a:r>
+              <a:rPr lang="en-US" sz="2800" dirty="0" err="1">
+                <a:solidFill>
+                  <a:schemeClr val="accent2"/>
+                </a:solidFill>
+              </a:rPr>
+              <a:t>Controllers.HomeController.en.resx</a:t>
+            </a:r>
+            <a:endParaRPr lang="en-US" sz="2800" dirty="0">
+              <a:solidFill>
+                <a:schemeClr val="accent2"/>
+              </a:solidFill>
+            </a:endParaRPr>
+          </a:p>
+          <a:p>
+            <a:pPr marL="0" indent="0">
+              <a:buNone/>
+            </a:pPr>
+            <a:r>
+              <a:rPr lang="en-US" sz="2800" dirty="0">
+                <a:solidFill>
+                  <a:schemeClr val="accent2"/>
+                </a:solidFill>
+              </a:rPr>
+              <a:t>Resources/</a:t>
+            </a:r>
+            <a:r>
+              <a:rPr lang="en-US" sz="2800" dirty="0" err="1">
+                <a:solidFill>
+                  <a:schemeClr val="accent2"/>
+                </a:solidFill>
+              </a:rPr>
+              <a:t>Controllers.HomeController.fr.resx</a:t>
+            </a:r>
+            <a:endParaRPr lang="en-US" sz="2800" dirty="0">
+              <a:solidFill>
+                <a:schemeClr val="accent2"/>
+              </a:solidFill>
+            </a:endParaRPr>
+          </a:p>
+          <a:p>
+            <a:pPr marL="0" indent="0">
+              <a:buNone/>
+            </a:pPr>
+            <a:r>
+              <a:rPr lang="en-US" sz="2800" dirty="0">
+                <a:solidFill>
+                  <a:schemeClr val="accent2"/>
+                </a:solidFill>
+              </a:rPr>
+              <a:t>Resources/</a:t>
+            </a:r>
+            <a:r>
+              <a:rPr lang="en-US" sz="2800" dirty="0" err="1">
+                <a:solidFill>
+                  <a:schemeClr val="accent2"/>
+                </a:solidFill>
+              </a:rPr>
+              <a:t>Controllers.HomeController.en.resx</a:t>
+            </a:r>
+            <a:endParaRPr lang="en-US" sz="2800" dirty="0">
+              <a:solidFill>
+                <a:schemeClr val="accent2"/>
+              </a:solidFill>
+            </a:endParaRPr>
+          </a:p>
+          <a:p>
+            <a:pPr marL="0" indent="0">
+              <a:buNone/>
+            </a:pPr>
+            <a:endParaRPr lang="en-US" sz="2800" dirty="0"/>
+          </a:p>
+          <a:p>
+            <a:pPr marL="0" indent="0">
+              <a:buNone/>
+            </a:pPr>
+            <a:r>
+              <a:rPr lang="en-US" sz="2800" dirty="0">
+                <a:solidFill>
+                  <a:srgbClr val="008272"/>
+                </a:solidFill>
+              </a:rPr>
+              <a:t>Resources/Controllers/</a:t>
+            </a:r>
+            <a:r>
+              <a:rPr lang="en-US" sz="2800" dirty="0" err="1">
+                <a:solidFill>
+                  <a:srgbClr val="008272"/>
+                </a:solidFill>
+              </a:rPr>
+              <a:t>HomeController.en.resx</a:t>
+            </a:r>
+            <a:endParaRPr lang="en-US" sz="2800" dirty="0">
+              <a:solidFill>
+                <a:srgbClr val="008272"/>
+              </a:solidFill>
+            </a:endParaRPr>
+          </a:p>
+          <a:p>
+            <a:pPr marL="0" indent="0">
+              <a:buNone/>
+            </a:pPr>
+            <a:r>
+              <a:rPr lang="en-US" sz="2800" dirty="0">
+                <a:solidFill>
+                  <a:srgbClr val="008272"/>
+                </a:solidFill>
+              </a:rPr>
+              <a:t>Resources/Controllers/</a:t>
+            </a:r>
+            <a:r>
+              <a:rPr lang="en-US" sz="2800" dirty="0" err="1">
+                <a:solidFill>
+                  <a:srgbClr val="008272"/>
+                </a:solidFill>
+              </a:rPr>
+              <a:t>HomeController.fr.resx</a:t>
+            </a:r>
+            <a:endParaRPr lang="en-US" sz="2800" dirty="0">
+              <a:solidFill>
+                <a:srgbClr val="008272"/>
+              </a:solidFill>
+            </a:endParaRPr>
+          </a:p>
+          <a:p>
+            <a:pPr marL="0" indent="0">
+              <a:buNone/>
+            </a:pPr>
+            <a:r>
+              <a:rPr lang="en-US" sz="2800" dirty="0">
+                <a:solidFill>
+                  <a:srgbClr val="008272"/>
+                </a:solidFill>
+              </a:rPr>
+              <a:t>Resources/Controllers/</a:t>
+            </a:r>
+            <a:r>
+              <a:rPr lang="en-US" sz="2800" dirty="0" err="1">
+                <a:solidFill>
+                  <a:srgbClr val="008272"/>
+                </a:solidFill>
+              </a:rPr>
+              <a:t>HomeController.en.resx</a:t>
+            </a:r>
+            <a:endParaRPr lang="en-US" sz="2800" dirty="0">
+              <a:solidFill>
+                <a:srgbClr val="008272"/>
+              </a:solidFill>
+            </a:endParaRPr>
           </a:p>
         </p:txBody>
       </p:sp>
@@ -5080,10 +5705,313 @@
           <a:chExt cx="0" cy="0"/>
         </a:xfrm>
       </p:grpSpPr>
+      <p:sp>
+        <p:nvSpPr>
+          <p:cNvPr id="3" name="TextBox 2">
+            <a:extLst>
+              <a:ext uri="{FF2B5EF4-FFF2-40B4-BE49-F238E27FC236}">
+                <a16:creationId xmlns:a16="http://schemas.microsoft.com/office/drawing/2014/main" id="{6440E2FA-8DC6-2F21-600D-BFA424429740}"/>
+              </a:ext>
+            </a:extLst>
+          </p:cNvPr>
+          <p:cNvSpPr txBox="1"/>
+          <p:nvPr/>
+        </p:nvSpPr>
+        <p:spPr>
+          <a:xfrm>
+            <a:off x="949841" y="2518074"/>
+            <a:ext cx="10724707" cy="2246769"/>
+          </a:xfrm>
+          <a:prstGeom prst="rect">
+            <a:avLst/>
+          </a:prstGeom>
+          <a:noFill/>
+        </p:spPr>
+        <p:txBody>
+          <a:bodyPr wrap="square">
+            <a:spAutoFit/>
+          </a:bodyPr>
+          <a:lstStyle/>
+          <a:p>
+            <a:r>
+              <a:rPr lang="en-US" sz="2800" dirty="0">
+                <a:solidFill>
+                  <a:srgbClr val="071591"/>
+                </a:solidFill>
+                <a:effectLst/>
+                <a:latin typeface="Hack" panose="020B0609030202020204" pitchFamily="49" charset="0"/>
+                <a:ea typeface="Hack" panose="020B0609030202020204" pitchFamily="49" charset="0"/>
+                <a:cs typeface="Hack" panose="020B0609030202020204" pitchFamily="49" charset="0"/>
+              </a:rPr>
+              <a:t>public </a:t>
+            </a:r>
+            <a:r>
+              <a:rPr lang="en-US" sz="2800" dirty="0" err="1">
+                <a:solidFill>
+                  <a:srgbClr val="000000"/>
+                </a:solidFill>
+                <a:effectLst/>
+                <a:latin typeface="Hack" panose="020B0609030202020204" pitchFamily="49" charset="0"/>
+                <a:ea typeface="Hack" panose="020B0609030202020204" pitchFamily="49" charset="0"/>
+                <a:cs typeface="Hack" panose="020B0609030202020204" pitchFamily="49" charset="0"/>
+              </a:rPr>
+              <a:t>IActionResult</a:t>
+            </a:r>
+            <a:r>
+              <a:rPr lang="en-US" sz="2800" dirty="0">
+                <a:solidFill>
+                  <a:srgbClr val="000000"/>
+                </a:solidFill>
+                <a:effectLst/>
+                <a:latin typeface="Hack" panose="020B0609030202020204" pitchFamily="49" charset="0"/>
+                <a:ea typeface="Hack" panose="020B0609030202020204" pitchFamily="49" charset="0"/>
+                <a:cs typeface="Hack" panose="020B0609030202020204" pitchFamily="49" charset="0"/>
+              </a:rPr>
+              <a:t> Index</a:t>
+            </a:r>
+            <a:r>
+              <a:rPr lang="en-US" sz="2800" dirty="0">
+                <a:solidFill>
+                  <a:srgbClr val="262626"/>
+                </a:solidFill>
+                <a:effectLst/>
+                <a:latin typeface="Hack" panose="020B0609030202020204" pitchFamily="49" charset="0"/>
+                <a:ea typeface="Hack" panose="020B0609030202020204" pitchFamily="49" charset="0"/>
+                <a:cs typeface="Hack" panose="020B0609030202020204" pitchFamily="49" charset="0"/>
+              </a:rPr>
+              <a:t>()</a:t>
+            </a:r>
+            <a:br>
+              <a:rPr lang="en-US" sz="2800" dirty="0">
+                <a:solidFill>
+                  <a:srgbClr val="262626"/>
+                </a:solidFill>
+                <a:effectLst/>
+                <a:latin typeface="Hack" panose="020B0609030202020204" pitchFamily="49" charset="0"/>
+                <a:ea typeface="Hack" panose="020B0609030202020204" pitchFamily="49" charset="0"/>
+                <a:cs typeface="Hack" panose="020B0609030202020204" pitchFamily="49" charset="0"/>
+              </a:rPr>
+            </a:br>
+            <a:r>
+              <a:rPr lang="en-US" sz="2800" dirty="0">
+                <a:solidFill>
+                  <a:srgbClr val="262626"/>
+                </a:solidFill>
+                <a:effectLst/>
+                <a:latin typeface="Hack" panose="020B0609030202020204" pitchFamily="49" charset="0"/>
+                <a:ea typeface="Hack" panose="020B0609030202020204" pitchFamily="49" charset="0"/>
+                <a:cs typeface="Hack" panose="020B0609030202020204" pitchFamily="49" charset="0"/>
+              </a:rPr>
+              <a:t>{</a:t>
+            </a:r>
+            <a:br>
+              <a:rPr lang="en-US" sz="2800" dirty="0">
+                <a:solidFill>
+                  <a:srgbClr val="262626"/>
+                </a:solidFill>
+                <a:effectLst/>
+                <a:latin typeface="Hack" panose="020B0609030202020204" pitchFamily="49" charset="0"/>
+                <a:ea typeface="Hack" panose="020B0609030202020204" pitchFamily="49" charset="0"/>
+                <a:cs typeface="Hack" panose="020B0609030202020204" pitchFamily="49" charset="0"/>
+              </a:rPr>
+            </a:br>
+            <a:r>
+              <a:rPr lang="en-US" sz="2800" dirty="0">
+                <a:solidFill>
+                  <a:srgbClr val="262626"/>
+                </a:solidFill>
+                <a:effectLst/>
+                <a:latin typeface="Hack" panose="020B0609030202020204" pitchFamily="49" charset="0"/>
+                <a:ea typeface="Hack" panose="020B0609030202020204" pitchFamily="49" charset="0"/>
+                <a:cs typeface="Hack" panose="020B0609030202020204" pitchFamily="49" charset="0"/>
+              </a:rPr>
+              <a:t>    </a:t>
+            </a:r>
+            <a:r>
+              <a:rPr lang="en-US" sz="2800" dirty="0" err="1">
+                <a:solidFill>
+                  <a:srgbClr val="660E7A"/>
+                </a:solidFill>
+                <a:effectLst/>
+                <a:latin typeface="Hack" panose="020B0609030202020204" pitchFamily="49" charset="0"/>
+                <a:ea typeface="Hack" panose="020B0609030202020204" pitchFamily="49" charset="0"/>
+                <a:cs typeface="Hack" panose="020B0609030202020204" pitchFamily="49" charset="0"/>
+              </a:rPr>
+              <a:t>ViewData</a:t>
+            </a:r>
+            <a:r>
+              <a:rPr lang="en-US" sz="2800" dirty="0">
+                <a:solidFill>
+                  <a:srgbClr val="262626"/>
+                </a:solidFill>
+                <a:effectLst/>
+                <a:latin typeface="Hack" panose="020B0609030202020204" pitchFamily="49" charset="0"/>
+                <a:ea typeface="Hack" panose="020B0609030202020204" pitchFamily="49" charset="0"/>
+                <a:cs typeface="Hack" panose="020B0609030202020204" pitchFamily="49" charset="0"/>
+              </a:rPr>
+              <a:t>[</a:t>
+            </a:r>
+            <a:r>
+              <a:rPr lang="en-US" sz="2800" dirty="0">
+                <a:solidFill>
+                  <a:srgbClr val="106B10"/>
+                </a:solidFill>
+                <a:effectLst/>
+                <a:latin typeface="Hack" panose="020B0609030202020204" pitchFamily="49" charset="0"/>
+                <a:ea typeface="Hack" panose="020B0609030202020204" pitchFamily="49" charset="0"/>
+                <a:cs typeface="Hack" panose="020B0609030202020204" pitchFamily="49" charset="0"/>
+              </a:rPr>
+              <a:t>"Title"</a:t>
+            </a:r>
+            <a:r>
+              <a:rPr lang="en-US" sz="2800" dirty="0">
+                <a:solidFill>
+                  <a:srgbClr val="262626"/>
+                </a:solidFill>
+                <a:effectLst/>
+                <a:latin typeface="Hack" panose="020B0609030202020204" pitchFamily="49" charset="0"/>
+                <a:ea typeface="Hack" panose="020B0609030202020204" pitchFamily="49" charset="0"/>
+                <a:cs typeface="Hack" panose="020B0609030202020204" pitchFamily="49" charset="0"/>
+              </a:rPr>
+              <a:t>] = </a:t>
+            </a:r>
+            <a:r>
+              <a:rPr lang="en-US" sz="2800" dirty="0">
+                <a:solidFill>
+                  <a:srgbClr val="660E7A"/>
+                </a:solidFill>
+                <a:effectLst/>
+                <a:latin typeface="Hack" panose="020B0609030202020204" pitchFamily="49" charset="0"/>
+                <a:ea typeface="Hack" panose="020B0609030202020204" pitchFamily="49" charset="0"/>
+                <a:cs typeface="Hack" panose="020B0609030202020204" pitchFamily="49" charset="0"/>
+              </a:rPr>
+              <a:t>_localizer</a:t>
+            </a:r>
+            <a:r>
+              <a:rPr lang="en-US" sz="2800" dirty="0">
+                <a:solidFill>
+                  <a:srgbClr val="262626"/>
+                </a:solidFill>
+                <a:effectLst/>
+                <a:latin typeface="Hack" panose="020B0609030202020204" pitchFamily="49" charset="0"/>
+                <a:ea typeface="Hack" panose="020B0609030202020204" pitchFamily="49" charset="0"/>
+                <a:cs typeface="Hack" panose="020B0609030202020204" pitchFamily="49" charset="0"/>
+              </a:rPr>
+              <a:t>[</a:t>
+            </a:r>
+            <a:r>
+              <a:rPr lang="en-US" sz="2800" dirty="0">
+                <a:solidFill>
+                  <a:srgbClr val="106B10"/>
+                </a:solidFill>
+                <a:effectLst/>
+                <a:latin typeface="Hack" panose="020B0609030202020204" pitchFamily="49" charset="0"/>
+                <a:ea typeface="Hack" panose="020B0609030202020204" pitchFamily="49" charset="0"/>
+                <a:cs typeface="Hack" panose="020B0609030202020204" pitchFamily="49" charset="0"/>
+              </a:rPr>
+              <a:t>"Title"</a:t>
+            </a:r>
+            <a:r>
+              <a:rPr lang="en-US" sz="2800" dirty="0">
+                <a:solidFill>
+                  <a:srgbClr val="262626"/>
+                </a:solidFill>
+                <a:effectLst/>
+                <a:latin typeface="Hack" panose="020B0609030202020204" pitchFamily="49" charset="0"/>
+                <a:ea typeface="Hack" panose="020B0609030202020204" pitchFamily="49" charset="0"/>
+                <a:cs typeface="Hack" panose="020B0609030202020204" pitchFamily="49" charset="0"/>
+              </a:rPr>
+              <a:t>];</a:t>
+            </a:r>
+            <a:br>
+              <a:rPr lang="en-US" sz="2800" dirty="0">
+                <a:solidFill>
+                  <a:srgbClr val="262626"/>
+                </a:solidFill>
+                <a:effectLst/>
+                <a:latin typeface="Hack" panose="020B0609030202020204" pitchFamily="49" charset="0"/>
+                <a:ea typeface="Hack" panose="020B0609030202020204" pitchFamily="49" charset="0"/>
+                <a:cs typeface="Hack" panose="020B0609030202020204" pitchFamily="49" charset="0"/>
+              </a:rPr>
+            </a:br>
+            <a:r>
+              <a:rPr lang="en-US" sz="2800" dirty="0">
+                <a:solidFill>
+                  <a:srgbClr val="262626"/>
+                </a:solidFill>
+                <a:effectLst/>
+                <a:latin typeface="Hack" panose="020B0609030202020204" pitchFamily="49" charset="0"/>
+                <a:ea typeface="Hack" panose="020B0609030202020204" pitchFamily="49" charset="0"/>
+                <a:cs typeface="Hack" panose="020B0609030202020204" pitchFamily="49" charset="0"/>
+              </a:rPr>
+              <a:t>    </a:t>
+            </a:r>
+            <a:r>
+              <a:rPr lang="en-US" sz="2800" dirty="0">
+                <a:solidFill>
+                  <a:srgbClr val="071591"/>
+                </a:solidFill>
+                <a:effectLst/>
+                <a:latin typeface="Hack" panose="020B0609030202020204" pitchFamily="49" charset="0"/>
+                <a:ea typeface="Hack" panose="020B0609030202020204" pitchFamily="49" charset="0"/>
+                <a:cs typeface="Hack" panose="020B0609030202020204" pitchFamily="49" charset="0"/>
+              </a:rPr>
+              <a:t>return </a:t>
+            </a:r>
+            <a:r>
+              <a:rPr lang="en-US" sz="2800" dirty="0">
+                <a:solidFill>
+                  <a:srgbClr val="185B9E"/>
+                </a:solidFill>
+                <a:effectLst/>
+                <a:latin typeface="Hack" panose="020B0609030202020204" pitchFamily="49" charset="0"/>
+                <a:ea typeface="Hack" panose="020B0609030202020204" pitchFamily="49" charset="0"/>
+                <a:cs typeface="Hack" panose="020B0609030202020204" pitchFamily="49" charset="0"/>
+              </a:rPr>
+              <a:t>View</a:t>
+            </a:r>
+            <a:r>
+              <a:rPr lang="en-US" sz="2800" dirty="0">
+                <a:solidFill>
+                  <a:srgbClr val="262626"/>
+                </a:solidFill>
+                <a:effectLst/>
+                <a:latin typeface="Hack" panose="020B0609030202020204" pitchFamily="49" charset="0"/>
+                <a:ea typeface="Hack" panose="020B0609030202020204" pitchFamily="49" charset="0"/>
+                <a:cs typeface="Hack" panose="020B0609030202020204" pitchFamily="49" charset="0"/>
+              </a:rPr>
+              <a:t>();</a:t>
+            </a:r>
+            <a:br>
+              <a:rPr lang="en-US" sz="2800" dirty="0">
+                <a:solidFill>
+                  <a:srgbClr val="262626"/>
+                </a:solidFill>
+                <a:effectLst/>
+                <a:latin typeface="Hack" panose="020B0609030202020204" pitchFamily="49" charset="0"/>
+                <a:ea typeface="Hack" panose="020B0609030202020204" pitchFamily="49" charset="0"/>
+                <a:cs typeface="Hack" panose="020B0609030202020204" pitchFamily="49" charset="0"/>
+              </a:rPr>
+            </a:br>
+            <a:r>
+              <a:rPr lang="en-US" sz="2800" dirty="0">
+                <a:solidFill>
+                  <a:srgbClr val="262626"/>
+                </a:solidFill>
+                <a:effectLst/>
+                <a:latin typeface="Hack" panose="020B0609030202020204" pitchFamily="49" charset="0"/>
+                <a:ea typeface="Hack" panose="020B0609030202020204" pitchFamily="49" charset="0"/>
+                <a:cs typeface="Hack" panose="020B0609030202020204" pitchFamily="49" charset="0"/>
+              </a:rPr>
+              <a:t>}</a:t>
+            </a:r>
+          </a:p>
+        </p:txBody>
+      </p:sp>
     </p:spTree>
     <p:extLst>
       <p:ext uri="{BB962C8B-B14F-4D97-AF65-F5344CB8AC3E}">
-        <p14:creationId xmlns:p14="http://schemas.microsoft.com/office/powerpoint/2010/main" val="2872087211"/>
+        <p14:creationId xmlns:p14="http://schemas.microsoft.com/office/powerpoint/2010/main" val="2467111738"/>
       </p:ext>
     </p:extLst>
   </p:cSld>
@@ -5112,6 +6040,761 @@
       </p:grpSpPr>
       <p:sp>
         <p:nvSpPr>
+          <p:cNvPr id="2" name="Content Placeholder 2">
+            <a:extLst>
+              <a:ext uri="{FF2B5EF4-FFF2-40B4-BE49-F238E27FC236}">
+                <a16:creationId xmlns:a16="http://schemas.microsoft.com/office/drawing/2014/main" id="{33ECA9D3-0391-ED3F-C174-A456E3E26EA7}"/>
+              </a:ext>
+            </a:extLst>
+          </p:cNvPr>
+          <p:cNvSpPr txBox="1">
+            <a:spLocks/>
+          </p:cNvSpPr>
+          <p:nvPr/>
+        </p:nvSpPr>
+        <p:spPr>
+          <a:xfrm>
+            <a:off x="269238" y="1214590"/>
+            <a:ext cx="11759729" cy="4764381"/>
+          </a:xfrm>
+          <a:prstGeom prst="rect">
+            <a:avLst/>
+          </a:prstGeom>
+        </p:spPr>
+        <p:txBody>
+          <a:bodyPr vert="horz" lIns="91440" tIns="45720" rIns="91440" bIns="45720" rtlCol="0" anchor="ctr"/>
+          <a:lstStyle>
+            <a:defPPr>
+              <a:defRPr lang="en-US"/>
+            </a:defPPr>
+            <a:lvl1pPr marL="0" algn="l" defTabSz="914400" rtl="0" eaLnBrk="1" latinLnBrk="0" hangingPunct="1">
+              <a:defRPr sz="800" kern="1200" cap="all" spc="100" baseline="0">
+                <a:solidFill>
+                  <a:schemeClr val="tx1"/>
+                </a:solidFill>
+                <a:latin typeface="+mn-lt"/>
+                <a:ea typeface="+mn-ea"/>
+                <a:cs typeface="+mn-cs"/>
+              </a:defRPr>
+            </a:lvl1pPr>
+            <a:lvl2pPr marL="457200" algn="l" defTabSz="914400" rtl="0" eaLnBrk="1" latinLnBrk="0" hangingPunct="1">
+              <a:defRPr sz="1800" kern="1200">
+                <a:solidFill>
+                  <a:schemeClr val="tx1"/>
+                </a:solidFill>
+                <a:latin typeface="+mn-lt"/>
+                <a:ea typeface="+mn-ea"/>
+                <a:cs typeface="+mn-cs"/>
+              </a:defRPr>
+            </a:lvl2pPr>
+            <a:lvl3pPr marL="914400" algn="l" defTabSz="914400" rtl="0" eaLnBrk="1" latinLnBrk="0" hangingPunct="1">
+              <a:defRPr sz="1800" kern="1200">
+                <a:solidFill>
+                  <a:schemeClr val="tx1"/>
+                </a:solidFill>
+                <a:latin typeface="+mn-lt"/>
+                <a:ea typeface="+mn-ea"/>
+                <a:cs typeface="+mn-cs"/>
+              </a:defRPr>
+            </a:lvl3pPr>
+            <a:lvl4pPr marL="1371600" algn="l" defTabSz="914400" rtl="0" eaLnBrk="1" latinLnBrk="0" hangingPunct="1">
+              <a:defRPr sz="1800" kern="1200">
+                <a:solidFill>
+                  <a:schemeClr val="tx1"/>
+                </a:solidFill>
+                <a:latin typeface="+mn-lt"/>
+                <a:ea typeface="+mn-ea"/>
+                <a:cs typeface="+mn-cs"/>
+              </a:defRPr>
+            </a:lvl4pPr>
+            <a:lvl5pPr marL="1828800" algn="l" defTabSz="914400" rtl="0" eaLnBrk="1" latinLnBrk="0" hangingPunct="1">
+              <a:defRPr sz="1800" kern="1200">
+                <a:solidFill>
+                  <a:schemeClr val="tx1"/>
+                </a:solidFill>
+                <a:latin typeface="+mn-lt"/>
+                <a:ea typeface="+mn-ea"/>
+                <a:cs typeface="+mn-cs"/>
+              </a:defRPr>
+            </a:lvl5pPr>
+            <a:lvl6pPr marL="2286000" algn="l" defTabSz="914400" rtl="0" eaLnBrk="1" latinLnBrk="0" hangingPunct="1">
+              <a:defRPr sz="1800" kern="1200">
+                <a:solidFill>
+                  <a:schemeClr val="tx1"/>
+                </a:solidFill>
+                <a:latin typeface="+mn-lt"/>
+                <a:ea typeface="+mn-ea"/>
+                <a:cs typeface="+mn-cs"/>
+              </a:defRPr>
+            </a:lvl6pPr>
+            <a:lvl7pPr marL="2743200" algn="l" defTabSz="914400" rtl="0" eaLnBrk="1" latinLnBrk="0" hangingPunct="1">
+              <a:defRPr sz="1800" kern="1200">
+                <a:solidFill>
+                  <a:schemeClr val="tx1"/>
+                </a:solidFill>
+                <a:latin typeface="+mn-lt"/>
+                <a:ea typeface="+mn-ea"/>
+                <a:cs typeface="+mn-cs"/>
+              </a:defRPr>
+            </a:lvl7pPr>
+            <a:lvl8pPr marL="3200400" algn="l" defTabSz="914400" rtl="0" eaLnBrk="1" latinLnBrk="0" hangingPunct="1">
+              <a:defRPr sz="1800" kern="1200">
+                <a:solidFill>
+                  <a:schemeClr val="tx1"/>
+                </a:solidFill>
+                <a:latin typeface="+mn-lt"/>
+                <a:ea typeface="+mn-ea"/>
+                <a:cs typeface="+mn-cs"/>
+              </a:defRPr>
+            </a:lvl8pPr>
+            <a:lvl9pPr marL="3657600" algn="l" defTabSz="914400" rtl="0" eaLnBrk="1" latinLnBrk="0" hangingPunct="1">
+              <a:defRPr sz="1800" kern="1200">
+                <a:solidFill>
+                  <a:schemeClr val="tx1"/>
+                </a:solidFill>
+                <a:latin typeface="+mn-lt"/>
+                <a:ea typeface="+mn-ea"/>
+                <a:cs typeface="+mn-cs"/>
+              </a:defRPr>
+            </a:lvl9pPr>
+          </a:lstStyle>
+          <a:p>
+            <a:r>
+              <a:rPr lang="en-US" sz="2800" dirty="0">
+                <a:solidFill>
+                  <a:srgbClr val="C586C0"/>
+                </a:solidFill>
+                <a:latin typeface="Hack" panose="020B0609030202020204" pitchFamily="49" charset="0"/>
+                <a:ea typeface="Hack" panose="020B0609030202020204" pitchFamily="49" charset="0"/>
+                <a:cs typeface="Hack" panose="020B0609030202020204" pitchFamily="49" charset="0"/>
+              </a:rPr>
+              <a:t>@using</a:t>
+            </a:r>
+            <a:r>
+              <a:rPr lang="en-US" sz="2800" dirty="0">
+                <a:solidFill>
+                  <a:srgbClr val="D4D4D4"/>
+                </a:solidFill>
+                <a:latin typeface="Hack" panose="020B0609030202020204" pitchFamily="49" charset="0"/>
+                <a:ea typeface="Hack" panose="020B0609030202020204" pitchFamily="49" charset="0"/>
+                <a:cs typeface="Hack" panose="020B0609030202020204" pitchFamily="49" charset="0"/>
+              </a:rPr>
+              <a:t> </a:t>
+            </a:r>
+            <a:r>
+              <a:rPr lang="en-US" sz="2800" dirty="0" err="1">
+                <a:solidFill>
+                  <a:srgbClr val="569CD6"/>
+                </a:solidFill>
+                <a:latin typeface="Hack" panose="020B0609030202020204" pitchFamily="49" charset="0"/>
+                <a:ea typeface="Hack" panose="020B0609030202020204" pitchFamily="49" charset="0"/>
+                <a:cs typeface="Hack" panose="020B0609030202020204" pitchFamily="49" charset="0"/>
+              </a:rPr>
+              <a:t>Microsoft</a:t>
+            </a:r>
+            <a:r>
+              <a:rPr lang="en-US" sz="2800" dirty="0" err="1">
+                <a:solidFill>
+                  <a:schemeClr val="accent6"/>
+                </a:solidFill>
+                <a:latin typeface="Hack" panose="020B0609030202020204" pitchFamily="49" charset="0"/>
+                <a:ea typeface="Hack" panose="020B0609030202020204" pitchFamily="49" charset="0"/>
+                <a:cs typeface="Hack" panose="020B0609030202020204" pitchFamily="49" charset="0"/>
+              </a:rPr>
+              <a:t>.</a:t>
+            </a:r>
+            <a:r>
+              <a:rPr lang="en-US" sz="2800" dirty="0" err="1">
+                <a:solidFill>
+                  <a:srgbClr val="569CD6"/>
+                </a:solidFill>
+                <a:latin typeface="Hack" panose="020B0609030202020204" pitchFamily="49" charset="0"/>
+                <a:ea typeface="Hack" panose="020B0609030202020204" pitchFamily="49" charset="0"/>
+                <a:cs typeface="Hack" panose="020B0609030202020204" pitchFamily="49" charset="0"/>
+              </a:rPr>
+              <a:t>AspNetCore</a:t>
+            </a:r>
+            <a:r>
+              <a:rPr lang="en-US" sz="2800" dirty="0" err="1">
+                <a:solidFill>
+                  <a:schemeClr val="accent6"/>
+                </a:solidFill>
+                <a:latin typeface="Hack" panose="020B0609030202020204" pitchFamily="49" charset="0"/>
+                <a:ea typeface="Hack" panose="020B0609030202020204" pitchFamily="49" charset="0"/>
+                <a:cs typeface="Hack" panose="020B0609030202020204" pitchFamily="49" charset="0"/>
+              </a:rPr>
+              <a:t>.</a:t>
+            </a:r>
+            <a:r>
+              <a:rPr lang="en-US" sz="2800" dirty="0" err="1">
+                <a:solidFill>
+                  <a:srgbClr val="569CD6"/>
+                </a:solidFill>
+                <a:latin typeface="Hack" panose="020B0609030202020204" pitchFamily="49" charset="0"/>
+                <a:ea typeface="Hack" panose="020B0609030202020204" pitchFamily="49" charset="0"/>
+                <a:cs typeface="Hack" panose="020B0609030202020204" pitchFamily="49" charset="0"/>
+              </a:rPr>
+              <a:t>Mvc</a:t>
+            </a:r>
+            <a:r>
+              <a:rPr lang="en-US" sz="2800" dirty="0" err="1">
+                <a:solidFill>
+                  <a:schemeClr val="accent6"/>
+                </a:solidFill>
+                <a:latin typeface="Hack" panose="020B0609030202020204" pitchFamily="49" charset="0"/>
+                <a:ea typeface="Hack" panose="020B0609030202020204" pitchFamily="49" charset="0"/>
+                <a:cs typeface="Hack" panose="020B0609030202020204" pitchFamily="49" charset="0"/>
+              </a:rPr>
+              <a:t>.</a:t>
+            </a:r>
+            <a:r>
+              <a:rPr lang="en-US" sz="2800" dirty="0" err="1">
+                <a:solidFill>
+                  <a:srgbClr val="569CD6"/>
+                </a:solidFill>
+                <a:latin typeface="Hack" panose="020B0609030202020204" pitchFamily="49" charset="0"/>
+                <a:ea typeface="Hack" panose="020B0609030202020204" pitchFamily="49" charset="0"/>
+                <a:cs typeface="Hack" panose="020B0609030202020204" pitchFamily="49" charset="0"/>
+              </a:rPr>
+              <a:t>Localization</a:t>
+            </a:r>
+            <a:endParaRPr lang="en-US" sz="2800" dirty="0">
+              <a:solidFill>
+                <a:srgbClr val="D4D4D4"/>
+              </a:solidFill>
+              <a:latin typeface="Hack" panose="020B0609030202020204" pitchFamily="49" charset="0"/>
+              <a:ea typeface="Hack" panose="020B0609030202020204" pitchFamily="49" charset="0"/>
+              <a:cs typeface="Hack" panose="020B0609030202020204" pitchFamily="49" charset="0"/>
+            </a:endParaRPr>
+          </a:p>
+          <a:p>
+            <a:br>
+              <a:rPr lang="en-US" sz="2800" dirty="0">
+                <a:solidFill>
+                  <a:srgbClr val="D4D4D4"/>
+                </a:solidFill>
+                <a:latin typeface="Hack" panose="020B0609030202020204" pitchFamily="49" charset="0"/>
+                <a:ea typeface="Hack" panose="020B0609030202020204" pitchFamily="49" charset="0"/>
+                <a:cs typeface="Hack" panose="020B0609030202020204" pitchFamily="49" charset="0"/>
+              </a:rPr>
+            </a:br>
+            <a:r>
+              <a:rPr lang="en-US" sz="2800" dirty="0">
+                <a:solidFill>
+                  <a:srgbClr val="C586C0"/>
+                </a:solidFill>
+                <a:latin typeface="Hack" panose="020B0609030202020204" pitchFamily="49" charset="0"/>
+                <a:ea typeface="Hack" panose="020B0609030202020204" pitchFamily="49" charset="0"/>
+                <a:cs typeface="Hack" panose="020B0609030202020204" pitchFamily="49" charset="0"/>
+              </a:rPr>
+              <a:t>@inject</a:t>
+            </a:r>
+            <a:r>
+              <a:rPr lang="en-US" sz="2800" dirty="0">
+                <a:solidFill>
+                  <a:srgbClr val="D4D4D4"/>
+                </a:solidFill>
+                <a:latin typeface="Hack" panose="020B0609030202020204" pitchFamily="49" charset="0"/>
+                <a:ea typeface="Hack" panose="020B0609030202020204" pitchFamily="49" charset="0"/>
+                <a:cs typeface="Hack" panose="020B0609030202020204" pitchFamily="49" charset="0"/>
+              </a:rPr>
+              <a:t> </a:t>
+            </a:r>
+            <a:r>
+              <a:rPr lang="en-US" sz="2800" dirty="0" err="1">
+                <a:solidFill>
+                  <a:srgbClr val="569CD6"/>
+                </a:solidFill>
+                <a:latin typeface="Hack" panose="020B0609030202020204" pitchFamily="49" charset="0"/>
+                <a:ea typeface="Hack" panose="020B0609030202020204" pitchFamily="49" charset="0"/>
+                <a:cs typeface="Hack" panose="020B0609030202020204" pitchFamily="49" charset="0"/>
+              </a:rPr>
+              <a:t>IViewLocalizer</a:t>
+            </a:r>
+            <a:r>
+              <a:rPr lang="en-US" sz="2800" dirty="0">
+                <a:solidFill>
+                  <a:srgbClr val="C586C0"/>
+                </a:solidFill>
+                <a:latin typeface="Hack" panose="020B0609030202020204" pitchFamily="49" charset="0"/>
+                <a:ea typeface="Hack" panose="020B0609030202020204" pitchFamily="49" charset="0"/>
+                <a:cs typeface="Hack" panose="020B0609030202020204" pitchFamily="49" charset="0"/>
+              </a:rPr>
+              <a:t> </a:t>
+            </a:r>
+            <a:r>
+              <a:rPr lang="en-US" sz="2800" dirty="0">
+                <a:solidFill>
+                  <a:schemeClr val="accent6"/>
+                </a:solidFill>
+                <a:latin typeface="Hack" panose="020B0609030202020204" pitchFamily="49" charset="0"/>
+                <a:ea typeface="Hack" panose="020B0609030202020204" pitchFamily="49" charset="0"/>
+                <a:cs typeface="Hack" panose="020B0609030202020204" pitchFamily="49" charset="0"/>
+              </a:rPr>
+              <a:t>Localizer</a:t>
+            </a:r>
+          </a:p>
+          <a:p>
+            <a:br>
+              <a:rPr lang="en-US" sz="2800" dirty="0">
+                <a:solidFill>
+                  <a:srgbClr val="D4D4D4"/>
+                </a:solidFill>
+                <a:latin typeface="Hack" panose="020B0609030202020204" pitchFamily="49" charset="0"/>
+                <a:ea typeface="Hack" panose="020B0609030202020204" pitchFamily="49" charset="0"/>
+                <a:cs typeface="Hack" panose="020B0609030202020204" pitchFamily="49" charset="0"/>
+              </a:rPr>
+            </a:br>
+            <a:r>
+              <a:rPr lang="en-US" sz="2800" dirty="0">
+                <a:solidFill>
+                  <a:srgbClr val="C586C0"/>
+                </a:solidFill>
+                <a:latin typeface="Hack" panose="020B0609030202020204" pitchFamily="49" charset="0"/>
+                <a:ea typeface="Hack" panose="020B0609030202020204" pitchFamily="49" charset="0"/>
+                <a:cs typeface="Hack" panose="020B0609030202020204" pitchFamily="49" charset="0"/>
+              </a:rPr>
+              <a:t>@</a:t>
+            </a:r>
+            <a:r>
+              <a:rPr lang="en-US" sz="2800" dirty="0">
+                <a:solidFill>
+                  <a:schemeClr val="accent6"/>
+                </a:solidFill>
+                <a:latin typeface="Hack" panose="020B0609030202020204" pitchFamily="49" charset="0"/>
+                <a:ea typeface="Hack" panose="020B0609030202020204" pitchFamily="49" charset="0"/>
+                <a:cs typeface="Hack" panose="020B0609030202020204" pitchFamily="49" charset="0"/>
+              </a:rPr>
+              <a:t>{</a:t>
+            </a:r>
+          </a:p>
+          <a:p>
+            <a:r>
+              <a:rPr lang="en-US" sz="2800" dirty="0">
+                <a:solidFill>
+                  <a:srgbClr val="C586C0"/>
+                </a:solidFill>
+                <a:latin typeface="Hack" panose="020B0609030202020204" pitchFamily="49" charset="0"/>
+                <a:ea typeface="Hack" panose="020B0609030202020204" pitchFamily="49" charset="0"/>
+                <a:cs typeface="Hack" panose="020B0609030202020204" pitchFamily="49" charset="0"/>
+              </a:rPr>
+              <a:t>	</a:t>
+            </a:r>
+            <a:r>
+              <a:rPr lang="en-US" sz="2800" dirty="0" err="1">
+                <a:solidFill>
+                  <a:srgbClr val="C586C0"/>
+                </a:solidFill>
+                <a:latin typeface="Hack" panose="020B0609030202020204" pitchFamily="49" charset="0"/>
+                <a:ea typeface="Hack" panose="020B0609030202020204" pitchFamily="49" charset="0"/>
+                <a:cs typeface="Hack" panose="020B0609030202020204" pitchFamily="49" charset="0"/>
+              </a:rPr>
+              <a:t>ViewData</a:t>
+            </a:r>
+            <a:r>
+              <a:rPr lang="en-US" sz="2800" dirty="0">
+                <a:solidFill>
+                  <a:schemeClr val="accent6"/>
+                </a:solidFill>
+                <a:latin typeface="Hack" panose="020B0609030202020204" pitchFamily="49" charset="0"/>
+                <a:ea typeface="Hack" panose="020B0609030202020204" pitchFamily="49" charset="0"/>
+                <a:cs typeface="Hack" panose="020B0609030202020204" pitchFamily="49" charset="0"/>
+              </a:rPr>
+              <a:t>[</a:t>
+            </a:r>
+            <a:r>
+              <a:rPr lang="pt-BR" sz="2800" dirty="0">
+                <a:solidFill>
+                  <a:srgbClr val="CE9178"/>
+                </a:solidFill>
+                <a:latin typeface="Hack" panose="020B0609030202020204" pitchFamily="49" charset="0"/>
+                <a:ea typeface="Hack" panose="020B0609030202020204" pitchFamily="49" charset="0"/>
+                <a:cs typeface="Hack" panose="020B0609030202020204" pitchFamily="49" charset="0"/>
+              </a:rPr>
+              <a:t>"</a:t>
+            </a:r>
+            <a:r>
+              <a:rPr lang="en-US" sz="2800" dirty="0">
+                <a:solidFill>
+                  <a:srgbClr val="4EC9B0"/>
+                </a:solidFill>
+                <a:latin typeface="Hack" panose="020B0609030202020204" pitchFamily="49" charset="0"/>
+                <a:ea typeface="Hack" panose="020B0609030202020204" pitchFamily="49" charset="0"/>
+                <a:cs typeface="Hack" panose="020B0609030202020204" pitchFamily="49" charset="0"/>
+              </a:rPr>
+              <a:t>Title</a:t>
+            </a:r>
+            <a:r>
+              <a:rPr lang="pt-BR" sz="2800" dirty="0">
+                <a:solidFill>
+                  <a:srgbClr val="CE9178"/>
+                </a:solidFill>
+                <a:latin typeface="Hack" panose="020B0609030202020204" pitchFamily="49" charset="0"/>
+                <a:ea typeface="Hack" panose="020B0609030202020204" pitchFamily="49" charset="0"/>
+                <a:cs typeface="Hack" panose="020B0609030202020204" pitchFamily="49" charset="0"/>
+              </a:rPr>
+              <a:t>"</a:t>
+            </a:r>
+            <a:r>
+              <a:rPr lang="en-US" sz="2800" dirty="0">
+                <a:solidFill>
+                  <a:schemeClr val="accent6"/>
+                </a:solidFill>
+                <a:latin typeface="Hack" panose="020B0609030202020204" pitchFamily="49" charset="0"/>
+                <a:ea typeface="Hack" panose="020B0609030202020204" pitchFamily="49" charset="0"/>
+                <a:cs typeface="Hack" panose="020B0609030202020204" pitchFamily="49" charset="0"/>
+              </a:rPr>
+              <a:t>] =</a:t>
+            </a:r>
+            <a:r>
+              <a:rPr lang="en-US" sz="2800" dirty="0">
+                <a:solidFill>
+                  <a:srgbClr val="D4D4D4"/>
+                </a:solidFill>
+                <a:latin typeface="Hack" panose="020B0609030202020204" pitchFamily="49" charset="0"/>
+                <a:ea typeface="Hack" panose="020B0609030202020204" pitchFamily="49" charset="0"/>
+                <a:cs typeface="Hack" panose="020B0609030202020204" pitchFamily="49" charset="0"/>
+              </a:rPr>
+              <a:t> </a:t>
+            </a:r>
+            <a:r>
+              <a:rPr lang="en-US" sz="2800" dirty="0">
+                <a:solidFill>
+                  <a:srgbClr val="C586C0"/>
+                </a:solidFill>
+                <a:latin typeface="Hack" panose="020B0609030202020204" pitchFamily="49" charset="0"/>
+                <a:ea typeface="Hack" panose="020B0609030202020204" pitchFamily="49" charset="0"/>
+                <a:cs typeface="Hack" panose="020B0609030202020204" pitchFamily="49" charset="0"/>
+              </a:rPr>
+              <a:t>Localizer</a:t>
+            </a:r>
+            <a:r>
+              <a:rPr lang="en-US" sz="2800" dirty="0">
+                <a:solidFill>
+                  <a:schemeClr val="accent6"/>
+                </a:solidFill>
+                <a:latin typeface="Hack" panose="020B0609030202020204" pitchFamily="49" charset="0"/>
+                <a:ea typeface="Hack" panose="020B0609030202020204" pitchFamily="49" charset="0"/>
+                <a:cs typeface="Hack" panose="020B0609030202020204" pitchFamily="49" charset="0"/>
+              </a:rPr>
+              <a:t>[</a:t>
+            </a:r>
+            <a:r>
+              <a:rPr lang="pt-BR" sz="2800" dirty="0">
+                <a:solidFill>
+                  <a:srgbClr val="CE9178"/>
+                </a:solidFill>
+                <a:latin typeface="Hack" panose="020B0609030202020204" pitchFamily="49" charset="0"/>
+                <a:ea typeface="Hack" panose="020B0609030202020204" pitchFamily="49" charset="0"/>
+                <a:cs typeface="Hack" panose="020B0609030202020204" pitchFamily="49" charset="0"/>
+              </a:rPr>
+              <a:t>"</a:t>
+            </a:r>
+            <a:r>
+              <a:rPr lang="en-US" sz="2800" dirty="0" err="1">
+                <a:solidFill>
+                  <a:srgbClr val="4EC9B0"/>
+                </a:solidFill>
+                <a:latin typeface="Hack" panose="020B0609030202020204" pitchFamily="49" charset="0"/>
+                <a:ea typeface="Hack" panose="020B0609030202020204" pitchFamily="49" charset="0"/>
+                <a:cs typeface="Hack" panose="020B0609030202020204" pitchFamily="49" charset="0"/>
+              </a:rPr>
+              <a:t>HomeTitle</a:t>
+            </a:r>
+            <a:r>
+              <a:rPr lang="pt-BR" sz="2800" dirty="0">
+                <a:solidFill>
+                  <a:srgbClr val="CE9178"/>
+                </a:solidFill>
+                <a:latin typeface="Hack" panose="020B0609030202020204" pitchFamily="49" charset="0"/>
+                <a:ea typeface="Hack" panose="020B0609030202020204" pitchFamily="49" charset="0"/>
+                <a:cs typeface="Hack" panose="020B0609030202020204" pitchFamily="49" charset="0"/>
+              </a:rPr>
+              <a:t>"</a:t>
+            </a:r>
+            <a:r>
+              <a:rPr lang="en-US" sz="2800" dirty="0">
+                <a:solidFill>
+                  <a:schemeClr val="accent6"/>
+                </a:solidFill>
+                <a:latin typeface="Hack" panose="020B0609030202020204" pitchFamily="49" charset="0"/>
+                <a:ea typeface="Hack" panose="020B0609030202020204" pitchFamily="49" charset="0"/>
+                <a:cs typeface="Hack" panose="020B0609030202020204" pitchFamily="49" charset="0"/>
+              </a:rPr>
+              <a:t>];</a:t>
+            </a:r>
+          </a:p>
+          <a:p>
+            <a:r>
+              <a:rPr lang="en-US" sz="2800" dirty="0">
+                <a:solidFill>
+                  <a:schemeClr val="accent6"/>
+                </a:solidFill>
+                <a:latin typeface="Hack" panose="020B0609030202020204" pitchFamily="49" charset="0"/>
+                <a:ea typeface="Hack" panose="020B0609030202020204" pitchFamily="49" charset="0"/>
+                <a:cs typeface="Hack" panose="020B0609030202020204" pitchFamily="49" charset="0"/>
+              </a:rPr>
+              <a:t>}</a:t>
+            </a:r>
+          </a:p>
+          <a:p>
+            <a:r>
+              <a:rPr lang="pt-BR" sz="2800" dirty="0">
+                <a:solidFill>
+                  <a:srgbClr val="808080"/>
+                </a:solidFill>
+                <a:latin typeface="Hack" panose="020B0609030202020204" pitchFamily="49" charset="0"/>
+                <a:ea typeface="Hack" panose="020B0609030202020204" pitchFamily="49" charset="0"/>
+                <a:cs typeface="Hack" panose="020B0609030202020204" pitchFamily="49" charset="0"/>
+              </a:rPr>
+              <a:t>&lt;</a:t>
+            </a:r>
+            <a:r>
+              <a:rPr lang="pt-BR" sz="2800" dirty="0">
+                <a:solidFill>
+                  <a:srgbClr val="569CD6"/>
+                </a:solidFill>
+                <a:latin typeface="Hack" panose="020B0609030202020204" pitchFamily="49" charset="0"/>
+                <a:ea typeface="Hack" panose="020B0609030202020204" pitchFamily="49" charset="0"/>
+                <a:cs typeface="Hack" panose="020B0609030202020204" pitchFamily="49" charset="0"/>
+              </a:rPr>
+              <a:t>h1</a:t>
+            </a:r>
+            <a:r>
+              <a:rPr lang="pt-BR" sz="2800" dirty="0">
+                <a:solidFill>
+                  <a:srgbClr val="D4D4D4"/>
+                </a:solidFill>
+                <a:latin typeface="Hack" panose="020B0609030202020204" pitchFamily="49" charset="0"/>
+                <a:ea typeface="Hack" panose="020B0609030202020204" pitchFamily="49" charset="0"/>
+                <a:cs typeface="Hack" panose="020B0609030202020204" pitchFamily="49" charset="0"/>
+              </a:rPr>
+              <a:t> </a:t>
+            </a:r>
+            <a:r>
+              <a:rPr lang="pt-BR" sz="2800" dirty="0" err="1">
+                <a:solidFill>
+                  <a:schemeClr val="accent2">
+                    <a:lumMod val="60000"/>
+                    <a:lumOff val="40000"/>
+                  </a:schemeClr>
+                </a:solidFill>
+                <a:latin typeface="Hack" panose="020B0609030202020204" pitchFamily="49" charset="0"/>
+                <a:ea typeface="Hack" panose="020B0609030202020204" pitchFamily="49" charset="0"/>
+                <a:cs typeface="Hack" panose="020B0609030202020204" pitchFamily="49" charset="0"/>
+              </a:rPr>
+              <a:t>class</a:t>
+            </a:r>
+            <a:r>
+              <a:rPr lang="pt-BR" sz="2800" dirty="0">
+                <a:solidFill>
+                  <a:schemeClr val="accent6"/>
+                </a:solidFill>
+                <a:latin typeface="Hack" panose="020B0609030202020204" pitchFamily="49" charset="0"/>
+                <a:ea typeface="Hack" panose="020B0609030202020204" pitchFamily="49" charset="0"/>
+                <a:cs typeface="Hack" panose="020B0609030202020204" pitchFamily="49" charset="0"/>
+              </a:rPr>
+              <a:t>=</a:t>
+            </a:r>
+            <a:r>
+              <a:rPr lang="pt-BR" sz="2800" dirty="0">
+                <a:solidFill>
+                  <a:srgbClr val="CE9178"/>
+                </a:solidFill>
+                <a:latin typeface="Hack" panose="020B0609030202020204" pitchFamily="49" charset="0"/>
+                <a:ea typeface="Hack" panose="020B0609030202020204" pitchFamily="49" charset="0"/>
+                <a:cs typeface="Hack" panose="020B0609030202020204" pitchFamily="49" charset="0"/>
+              </a:rPr>
+              <a:t>"</a:t>
+            </a:r>
+            <a:r>
+              <a:rPr lang="pt-BR" sz="2800" dirty="0" err="1">
+                <a:solidFill>
+                  <a:srgbClr val="CE9178"/>
+                </a:solidFill>
+                <a:latin typeface="Hack" panose="020B0609030202020204" pitchFamily="49" charset="0"/>
+                <a:ea typeface="Hack" panose="020B0609030202020204" pitchFamily="49" charset="0"/>
+                <a:cs typeface="Hack" panose="020B0609030202020204" pitchFamily="49" charset="0"/>
+              </a:rPr>
+              <a:t>page</a:t>
+            </a:r>
+            <a:r>
+              <a:rPr lang="pt-BR" sz="2800" dirty="0">
+                <a:solidFill>
+                  <a:srgbClr val="CE9178"/>
+                </a:solidFill>
+                <a:latin typeface="Hack" panose="020B0609030202020204" pitchFamily="49" charset="0"/>
+                <a:ea typeface="Hack" panose="020B0609030202020204" pitchFamily="49" charset="0"/>
+                <a:cs typeface="Hack" panose="020B0609030202020204" pitchFamily="49" charset="0"/>
+              </a:rPr>
+              <a:t>-header"</a:t>
+            </a:r>
+            <a:r>
+              <a:rPr lang="pt-BR" sz="2800" dirty="0">
+                <a:solidFill>
+                  <a:srgbClr val="808080"/>
+                </a:solidFill>
+                <a:latin typeface="Hack" panose="020B0609030202020204" pitchFamily="49" charset="0"/>
+                <a:ea typeface="Hack" panose="020B0609030202020204" pitchFamily="49" charset="0"/>
+                <a:cs typeface="Hack" panose="020B0609030202020204" pitchFamily="49" charset="0"/>
+              </a:rPr>
+              <a:t>&gt;</a:t>
+            </a:r>
+            <a:r>
+              <a:rPr lang="pt-BR" sz="2800" dirty="0">
+                <a:solidFill>
+                  <a:srgbClr val="C586C0"/>
+                </a:solidFill>
+                <a:latin typeface="Hack" panose="020B0609030202020204" pitchFamily="49" charset="0"/>
+                <a:ea typeface="Hack" panose="020B0609030202020204" pitchFamily="49" charset="0"/>
+                <a:cs typeface="Hack" panose="020B0609030202020204" pitchFamily="49" charset="0"/>
+              </a:rPr>
+              <a:t>@</a:t>
+            </a:r>
+            <a:r>
+              <a:rPr lang="pt-BR" sz="2800" dirty="0" err="1">
+                <a:solidFill>
+                  <a:srgbClr val="C586C0"/>
+                </a:solidFill>
+                <a:latin typeface="Hack" panose="020B0609030202020204" pitchFamily="49" charset="0"/>
+                <a:ea typeface="Hack" panose="020B0609030202020204" pitchFamily="49" charset="0"/>
+                <a:cs typeface="Hack" panose="020B0609030202020204" pitchFamily="49" charset="0"/>
+              </a:rPr>
+              <a:t>ViewData</a:t>
+            </a:r>
+            <a:r>
+              <a:rPr lang="pt-BR" sz="2800" dirty="0">
+                <a:solidFill>
+                  <a:schemeClr val="accent6"/>
+                </a:solidFill>
+                <a:latin typeface="Hack" panose="020B0609030202020204" pitchFamily="49" charset="0"/>
+                <a:ea typeface="Hack" panose="020B0609030202020204" pitchFamily="49" charset="0"/>
+                <a:cs typeface="Hack" panose="020B0609030202020204" pitchFamily="49" charset="0"/>
+              </a:rPr>
+              <a:t>[</a:t>
+            </a:r>
+            <a:r>
+              <a:rPr lang="pt-BR" sz="2800" dirty="0">
+                <a:solidFill>
+                  <a:srgbClr val="CE9178"/>
+                </a:solidFill>
+                <a:latin typeface="Hack" panose="020B0609030202020204" pitchFamily="49" charset="0"/>
+                <a:ea typeface="Hack" panose="020B0609030202020204" pitchFamily="49" charset="0"/>
+                <a:cs typeface="Hack" panose="020B0609030202020204" pitchFamily="49" charset="0"/>
+              </a:rPr>
+              <a:t>"</a:t>
+            </a:r>
+            <a:r>
+              <a:rPr lang="en-US" sz="2800" dirty="0" err="1">
+                <a:solidFill>
+                  <a:srgbClr val="4EC9B0"/>
+                </a:solidFill>
+                <a:latin typeface="Hack" panose="020B0609030202020204" pitchFamily="49" charset="0"/>
+                <a:ea typeface="Hack" panose="020B0609030202020204" pitchFamily="49" charset="0"/>
+                <a:cs typeface="Hack" panose="020B0609030202020204" pitchFamily="49" charset="0"/>
+              </a:rPr>
+              <a:t>HomeTitle</a:t>
+            </a:r>
+            <a:r>
+              <a:rPr lang="pt-BR" sz="2800" dirty="0">
+                <a:solidFill>
+                  <a:srgbClr val="CE9178"/>
+                </a:solidFill>
+                <a:latin typeface="Hack" panose="020B0609030202020204" pitchFamily="49" charset="0"/>
+                <a:ea typeface="Hack" panose="020B0609030202020204" pitchFamily="49" charset="0"/>
+                <a:cs typeface="Hack" panose="020B0609030202020204" pitchFamily="49" charset="0"/>
+              </a:rPr>
+              <a:t>"</a:t>
+            </a:r>
+            <a:r>
+              <a:rPr lang="pt-BR" sz="2800" dirty="0">
+                <a:solidFill>
+                  <a:schemeClr val="accent6"/>
+                </a:solidFill>
+                <a:latin typeface="Hack" panose="020B0609030202020204" pitchFamily="49" charset="0"/>
+                <a:ea typeface="Hack" panose="020B0609030202020204" pitchFamily="49" charset="0"/>
+                <a:cs typeface="Hack" panose="020B0609030202020204" pitchFamily="49" charset="0"/>
+              </a:rPr>
+              <a:t>]</a:t>
+            </a:r>
+          </a:p>
+          <a:p>
+            <a:r>
+              <a:rPr lang="pt-BR" sz="2800" dirty="0">
+                <a:solidFill>
+                  <a:srgbClr val="808080"/>
+                </a:solidFill>
+                <a:latin typeface="Hack" panose="020B0609030202020204" pitchFamily="49" charset="0"/>
+                <a:ea typeface="Hack" panose="020B0609030202020204" pitchFamily="49" charset="0"/>
+                <a:cs typeface="Hack" panose="020B0609030202020204" pitchFamily="49" charset="0"/>
+              </a:rPr>
+              <a:t>&lt;/</a:t>
+            </a:r>
+            <a:r>
+              <a:rPr lang="pt-BR" sz="2800" dirty="0">
+                <a:solidFill>
+                  <a:srgbClr val="569CD6"/>
+                </a:solidFill>
+                <a:latin typeface="Hack" panose="020B0609030202020204" pitchFamily="49" charset="0"/>
+                <a:ea typeface="Hack" panose="020B0609030202020204" pitchFamily="49" charset="0"/>
+                <a:cs typeface="Hack" panose="020B0609030202020204" pitchFamily="49" charset="0"/>
+              </a:rPr>
+              <a:t>h1</a:t>
+            </a:r>
+            <a:r>
+              <a:rPr lang="pt-BR" sz="2800" dirty="0">
+                <a:solidFill>
+                  <a:srgbClr val="808080"/>
+                </a:solidFill>
+                <a:latin typeface="Hack" panose="020B0609030202020204" pitchFamily="49" charset="0"/>
+                <a:ea typeface="Hack" panose="020B0609030202020204" pitchFamily="49" charset="0"/>
+                <a:cs typeface="Hack" panose="020B0609030202020204" pitchFamily="49" charset="0"/>
+              </a:rPr>
+              <a:t>&gt;</a:t>
+            </a:r>
+            <a:endParaRPr lang="pt-BR" sz="2800" dirty="0">
+              <a:solidFill>
+                <a:srgbClr val="D4D4D4"/>
+              </a:solidFill>
+              <a:latin typeface="Hack" panose="020B0609030202020204" pitchFamily="49" charset="0"/>
+              <a:ea typeface="Hack" panose="020B0609030202020204" pitchFamily="49" charset="0"/>
+              <a:cs typeface="Hack" panose="020B0609030202020204" pitchFamily="49" charset="0"/>
+            </a:endParaRPr>
+          </a:p>
+        </p:txBody>
+      </p:sp>
+    </p:spTree>
+    <p:extLst>
+      <p:ext uri="{BB962C8B-B14F-4D97-AF65-F5344CB8AC3E}">
+        <p14:creationId xmlns:p14="http://schemas.microsoft.com/office/powerpoint/2010/main" val="2872087211"/>
+      </p:ext>
+    </p:extLst>
+  </p:cSld>
+  <p:clrMapOvr>
+    <a:masterClrMapping/>
+  </p:clrMapOvr>
+</p:sld>
+</file>
+
+<file path=ppt/slides/slide19.xml><?xml version="1.0" encoding="utf-8"?>
+<p:sld xmlns:a="http://schemas.openxmlformats.org/drawingml/2006/main" xmlns:r="http://schemas.openxmlformats.org/officeDocument/2006/relationships" xmlns:p="http://schemas.openxmlformats.org/presentationml/2006/main">
+  <p:cSld>
+    <p:spTree>
+      <p:nvGrpSpPr>
+        <p:cNvPr id="1" name=""/>
+        <p:cNvGrpSpPr/>
+        <p:nvPr/>
+      </p:nvGrpSpPr>
+      <p:grpSpPr>
+        <a:xfrm>
+          <a:off x="0" y="0"/>
+          <a:ext cx="0" cy="0"/>
+          <a:chOff x="0" y="0"/>
+          <a:chExt cx="0" cy="0"/>
+        </a:xfrm>
+      </p:grpSpPr>
+      <p:sp>
+        <p:nvSpPr>
           <p:cNvPr id="2" name="Title 1">
             <a:extLst>
               <a:ext uri="{FF2B5EF4-FFF2-40B4-BE49-F238E27FC236}">
@@ -5156,10 +6839,171 @@
         </p:nvSpPr>
         <p:spPr/>
         <p:txBody>
-          <a:bodyPr/>
+          <a:bodyPr>
+            <a:noAutofit/>
+          </a:bodyPr>
           <a:lstStyle/>
           <a:p>
-            <a:endParaRPr lang="en-US"/>
+            <a:pPr marL="0" indent="0">
+              <a:buNone/>
+            </a:pPr>
+            <a:r>
+              <a:rPr lang="en-US" sz="2800" dirty="0">
+                <a:solidFill>
+                  <a:srgbClr val="0078D7"/>
+                </a:solidFill>
+              </a:rPr>
+              <a:t>Resources/</a:t>
+            </a:r>
+            <a:r>
+              <a:rPr lang="en-US" sz="2800" dirty="0" err="1">
+                <a:solidFill>
+                  <a:srgbClr val="0078D7"/>
+                </a:solidFill>
+              </a:rPr>
+              <a:t>Views.Home.Index.en.resx</a:t>
+            </a:r>
+            <a:endParaRPr lang="en-US" sz="2800" dirty="0">
+              <a:solidFill>
+                <a:srgbClr val="0078D7"/>
+              </a:solidFill>
+            </a:endParaRPr>
+          </a:p>
+          <a:p>
+            <a:pPr marL="0" indent="0">
+              <a:buNone/>
+            </a:pPr>
+            <a:r>
+              <a:rPr lang="en-US" sz="2800" dirty="0">
+                <a:solidFill>
+                  <a:srgbClr val="0078D7"/>
+                </a:solidFill>
+              </a:rPr>
+              <a:t>Resources/</a:t>
+            </a:r>
+            <a:r>
+              <a:rPr lang="en-US" sz="2800" dirty="0" err="1">
+                <a:solidFill>
+                  <a:srgbClr val="0078D7"/>
+                </a:solidFill>
+              </a:rPr>
+              <a:t>Views.Home.Index.fr.resx</a:t>
+            </a:r>
+            <a:endParaRPr lang="en-US" sz="2800" dirty="0">
+              <a:solidFill>
+                <a:srgbClr val="0078D7"/>
+              </a:solidFill>
+            </a:endParaRPr>
+          </a:p>
+          <a:p>
+            <a:pPr marL="0" indent="0">
+              <a:buNone/>
+            </a:pPr>
+            <a:r>
+              <a:rPr lang="en-US" sz="2800" dirty="0">
+                <a:solidFill>
+                  <a:srgbClr val="0078D7"/>
+                </a:solidFill>
+              </a:rPr>
+              <a:t>Resources/</a:t>
+            </a:r>
+            <a:r>
+              <a:rPr lang="en-US" sz="2800" dirty="0" err="1">
+                <a:solidFill>
+                  <a:srgbClr val="0078D7"/>
+                </a:solidFill>
+              </a:rPr>
+              <a:t>Views.Home.Index.en.resx</a:t>
+            </a:r>
+            <a:endParaRPr lang="en-US" sz="2800" dirty="0">
+              <a:solidFill>
+                <a:srgbClr val="0078D7"/>
+              </a:solidFill>
+            </a:endParaRPr>
+          </a:p>
+          <a:p>
+            <a:pPr marL="0" indent="0">
+              <a:buNone/>
+            </a:pPr>
+            <a:endParaRPr lang="en-US" sz="2800" dirty="0"/>
+          </a:p>
+          <a:p>
+            <a:pPr marL="0" indent="0">
+              <a:buNone/>
+            </a:pPr>
+            <a:r>
+              <a:rPr lang="en-US" sz="2800" dirty="0">
+                <a:solidFill>
+                  <a:srgbClr val="008272"/>
+                </a:solidFill>
+              </a:rPr>
+              <a:t>Resources/Views/Home/</a:t>
+            </a:r>
+            <a:r>
+              <a:rPr lang="en-US" sz="2800" dirty="0" err="1">
+                <a:solidFill>
+                  <a:srgbClr val="008272"/>
+                </a:solidFill>
+              </a:rPr>
+              <a:t>Index.en.resx</a:t>
+            </a:r>
+            <a:endParaRPr lang="en-US" sz="2800" dirty="0">
+              <a:solidFill>
+                <a:srgbClr val="008272"/>
+              </a:solidFill>
+            </a:endParaRPr>
+          </a:p>
+          <a:p>
+            <a:pPr marL="0" indent="0">
+              <a:buNone/>
+            </a:pPr>
+            <a:r>
+              <a:rPr lang="en-US" sz="2800" dirty="0">
+                <a:solidFill>
+                  <a:srgbClr val="008272"/>
+                </a:solidFill>
+              </a:rPr>
+              <a:t>Resources/Views/Home/</a:t>
+            </a:r>
+            <a:r>
+              <a:rPr lang="en-US" sz="2800" dirty="0" err="1">
+                <a:solidFill>
+                  <a:srgbClr val="008272"/>
+                </a:solidFill>
+              </a:rPr>
+              <a:t>Index.fr.resx</a:t>
+            </a:r>
+            <a:endParaRPr lang="en-US" sz="2800" dirty="0">
+              <a:solidFill>
+                <a:srgbClr val="008272"/>
+              </a:solidFill>
+            </a:endParaRPr>
+          </a:p>
+          <a:p>
+            <a:pPr marL="0" indent="0">
+              <a:buNone/>
+            </a:pPr>
+            <a:r>
+              <a:rPr lang="en-US" sz="2800" dirty="0">
+                <a:solidFill>
+                  <a:srgbClr val="008272"/>
+                </a:solidFill>
+              </a:rPr>
+              <a:t>Resources/Views/Home/</a:t>
+            </a:r>
+            <a:r>
+              <a:rPr lang="en-US" sz="2800" dirty="0" err="1">
+                <a:solidFill>
+                  <a:srgbClr val="008272"/>
+                </a:solidFill>
+              </a:rPr>
+              <a:t>Index.en.resx</a:t>
+            </a:r>
+            <a:endParaRPr lang="en-US" sz="2800" dirty="0">
+              <a:solidFill>
+                <a:srgbClr val="008272"/>
+              </a:solidFill>
+            </a:endParaRPr>
           </a:p>
         </p:txBody>
       </p:sp>
@@ -5176,7 +7020,137 @@
 </p:sld>
 </file>
 
-<file path=ppt/slides/slide19.xml><?xml version="1.0" encoding="utf-8"?>
+<file path=ppt/slides/slide2.xml><?xml version="1.0" encoding="utf-8"?>
+<p:sld xmlns:a="http://schemas.openxmlformats.org/drawingml/2006/main" xmlns:r="http://schemas.openxmlformats.org/officeDocument/2006/relationships" xmlns:p="http://schemas.openxmlformats.org/presentationml/2006/main">
+  <p:cSld>
+    <p:spTree>
+      <p:nvGrpSpPr>
+        <p:cNvPr id="1" name=""/>
+        <p:cNvGrpSpPr/>
+        <p:nvPr/>
+      </p:nvGrpSpPr>
+      <p:grpSpPr>
+        <a:xfrm>
+          <a:off x="0" y="0"/>
+          <a:ext cx="0" cy="0"/>
+          <a:chOff x="0" y="0"/>
+          <a:chExt cx="0" cy="0"/>
+        </a:xfrm>
+      </p:grpSpPr>
+      <p:sp>
+        <p:nvSpPr>
+          <p:cNvPr id="2" name="Title 1">
+            <a:extLst>
+              <a:ext uri="{FF2B5EF4-FFF2-40B4-BE49-F238E27FC236}">
+                <a16:creationId xmlns:a16="http://schemas.microsoft.com/office/drawing/2014/main" id="{D58C4497-F3C0-62EB-C34D-2F4494A7296F}"/>
+              </a:ext>
+            </a:extLst>
+          </p:cNvPr>
+          <p:cNvSpPr>
+            <a:spLocks noGrp="1"/>
+          </p:cNvSpPr>
+          <p:nvPr>
+            <p:ph type="title"/>
+          </p:nvPr>
+        </p:nvSpPr>
+        <p:spPr/>
+        <p:txBody>
+          <a:bodyPr/>
+          <a:lstStyle/>
+          <a:p>
+            <a:r>
+              <a:rPr lang="en-US" dirty="0"/>
+              <a:t>Agenda</a:t>
+            </a:r>
+          </a:p>
+        </p:txBody>
+      </p:sp>
+      <p:sp>
+        <p:nvSpPr>
+          <p:cNvPr id="3" name="Content Placeholder 2">
+            <a:extLst>
+              <a:ext uri="{FF2B5EF4-FFF2-40B4-BE49-F238E27FC236}">
+                <a16:creationId xmlns:a16="http://schemas.microsoft.com/office/drawing/2014/main" id="{CEE598F8-1EB6-B247-DAC8-1D21AF605A90}"/>
+              </a:ext>
+            </a:extLst>
+          </p:cNvPr>
+          <p:cNvSpPr>
+            <a:spLocks noGrp="1"/>
+          </p:cNvSpPr>
+          <p:nvPr>
+            <p:ph idx="1"/>
+          </p:nvPr>
+        </p:nvSpPr>
+        <p:spPr/>
+        <p:txBody>
+          <a:bodyPr>
+            <a:normAutofit/>
+          </a:bodyPr>
+          <a:lstStyle/>
+          <a:p>
+            <a:r>
+              <a:rPr lang="en-US" dirty="0"/>
+              <a:t>Overview</a:t>
+            </a:r>
+          </a:p>
+          <a:p>
+            <a:r>
+              <a:rPr lang="en-US" dirty="0"/>
+              <a:t>Globalizing ASP.NET Core MVC Projects</a:t>
+            </a:r>
+          </a:p>
+          <a:p>
+            <a:r>
+              <a:rPr lang="en-US" dirty="0"/>
+              <a:t>Resource Files</a:t>
+            </a:r>
+          </a:p>
+          <a:p>
+            <a:r>
+              <a:rPr lang="en-US" dirty="0"/>
+              <a:t>Localizing ASP.NET Core MVC Projects</a:t>
+            </a:r>
+          </a:p>
+          <a:p>
+            <a:r>
+              <a:rPr lang="en-US" dirty="0"/>
+              <a:t>User Selectable Culture w/ Cookies</a:t>
+            </a:r>
+          </a:p>
+          <a:p>
+            <a:r>
+              <a:rPr lang="en-US" dirty="0"/>
+              <a:t>Data Annotations</a:t>
+            </a:r>
+          </a:p>
+          <a:p>
+            <a:r>
+              <a:rPr lang="en-US" dirty="0"/>
+              <a:t>Custom Providers</a:t>
+            </a:r>
+          </a:p>
+          <a:p>
+            <a:r>
+              <a:rPr lang="en-US" dirty="0"/>
+              <a:t>Custom Localizers</a:t>
+            </a:r>
+          </a:p>
+        </p:txBody>
+      </p:sp>
+    </p:spTree>
+    <p:extLst>
+      <p:ext uri="{BB962C8B-B14F-4D97-AF65-F5344CB8AC3E}">
+        <p14:creationId xmlns:p14="http://schemas.microsoft.com/office/powerpoint/2010/main" val="4275784187"/>
+      </p:ext>
+    </p:extLst>
+  </p:cSld>
+  <p:clrMapOvr>
+    <a:masterClrMapping/>
+  </p:clrMapOvr>
+</p:sld>
+</file>
+
+<file path=ppt/slides/slide20.xml><?xml version="1.0" encoding="utf-8"?>
 <p:sld xmlns:a="http://schemas.openxmlformats.org/drawingml/2006/main" xmlns:r="http://schemas.openxmlformats.org/officeDocument/2006/relationships" xmlns:p="http://schemas.openxmlformats.org/presentationml/2006/main">
   <p:cSld>
     <p:spTree>
@@ -5367,137 +7341,7 @@
 </p:sld>
 </file>
 
-<file path=ppt/slides/slide2.xml><?xml version="1.0" encoding="utf-8"?>
-<p:sld xmlns:a="http://schemas.openxmlformats.org/drawingml/2006/main" xmlns:r="http://schemas.openxmlformats.org/officeDocument/2006/relationships" xmlns:p="http://schemas.openxmlformats.org/presentationml/2006/main">
-  <p:cSld>
-    <p:spTree>
-      <p:nvGrpSpPr>
-        <p:cNvPr id="1" name=""/>
-        <p:cNvGrpSpPr/>
-        <p:nvPr/>
-      </p:nvGrpSpPr>
-      <p:grpSpPr>
-        <a:xfrm>
-          <a:off x="0" y="0"/>
-          <a:ext cx="0" cy="0"/>
-          <a:chOff x="0" y="0"/>
-          <a:chExt cx="0" cy="0"/>
-        </a:xfrm>
-      </p:grpSpPr>
-      <p:sp>
-        <p:nvSpPr>
-          <p:cNvPr id="2" name="Title 1">
-            <a:extLst>
-              <a:ext uri="{FF2B5EF4-FFF2-40B4-BE49-F238E27FC236}">
-                <a16:creationId xmlns:a16="http://schemas.microsoft.com/office/drawing/2014/main" id="{D58C4497-F3C0-62EB-C34D-2F4494A7296F}"/>
-              </a:ext>
-            </a:extLst>
-          </p:cNvPr>
-          <p:cNvSpPr>
-            <a:spLocks noGrp="1"/>
-          </p:cNvSpPr>
-          <p:nvPr>
-            <p:ph type="title"/>
-          </p:nvPr>
-        </p:nvSpPr>
-        <p:spPr/>
-        <p:txBody>
-          <a:bodyPr/>
-          <a:lstStyle/>
-          <a:p>
-            <a:r>
-              <a:rPr lang="en-US" dirty="0"/>
-              <a:t>Agenda</a:t>
-            </a:r>
-          </a:p>
-        </p:txBody>
-      </p:sp>
-      <p:sp>
-        <p:nvSpPr>
-          <p:cNvPr id="3" name="Content Placeholder 2">
-            <a:extLst>
-              <a:ext uri="{FF2B5EF4-FFF2-40B4-BE49-F238E27FC236}">
-                <a16:creationId xmlns:a16="http://schemas.microsoft.com/office/drawing/2014/main" id="{CEE598F8-1EB6-B247-DAC8-1D21AF605A90}"/>
-              </a:ext>
-            </a:extLst>
-          </p:cNvPr>
-          <p:cNvSpPr>
-            <a:spLocks noGrp="1"/>
-          </p:cNvSpPr>
-          <p:nvPr>
-            <p:ph idx="1"/>
-          </p:nvPr>
-        </p:nvSpPr>
-        <p:spPr/>
-        <p:txBody>
-          <a:bodyPr>
-            <a:normAutofit/>
-          </a:bodyPr>
-          <a:lstStyle/>
-          <a:p>
-            <a:r>
-              <a:rPr lang="en-US" dirty="0"/>
-              <a:t>Overview</a:t>
-            </a:r>
-          </a:p>
-          <a:p>
-            <a:r>
-              <a:rPr lang="en-US" dirty="0"/>
-              <a:t>Globalizing ASP.NET Core MVC Projects</a:t>
-            </a:r>
-          </a:p>
-          <a:p>
-            <a:r>
-              <a:rPr lang="en-US" dirty="0"/>
-              <a:t>Resource Files</a:t>
-            </a:r>
-          </a:p>
-          <a:p>
-            <a:r>
-              <a:rPr lang="en-US" dirty="0"/>
-              <a:t>Localizing ASP.NET Core MVC Projects</a:t>
-            </a:r>
-          </a:p>
-          <a:p>
-            <a:r>
-              <a:rPr lang="en-US" dirty="0"/>
-              <a:t>User Selectable Culture w/ Cookies</a:t>
-            </a:r>
-          </a:p>
-          <a:p>
-            <a:r>
-              <a:rPr lang="en-US" dirty="0"/>
-              <a:t>Data Annotations</a:t>
-            </a:r>
-          </a:p>
-          <a:p>
-            <a:r>
-              <a:rPr lang="en-US" dirty="0"/>
-              <a:t>Custom Providers</a:t>
-            </a:r>
-          </a:p>
-          <a:p>
-            <a:r>
-              <a:rPr lang="en-US" dirty="0"/>
-              <a:t>Custom Localizers</a:t>
-            </a:r>
-          </a:p>
-        </p:txBody>
-      </p:sp>
-    </p:spTree>
-    <p:extLst>
-      <p:ext uri="{BB962C8B-B14F-4D97-AF65-F5344CB8AC3E}">
-        <p14:creationId xmlns:p14="http://schemas.microsoft.com/office/powerpoint/2010/main" val="4275784187"/>
-      </p:ext>
-    </p:extLst>
-  </p:cSld>
-  <p:clrMapOvr>
-    <a:masterClrMapping/>
-  </p:clrMapOvr>
-</p:sld>
-</file>
-
-<file path=ppt/slides/slide20.xml><?xml version="1.0" encoding="utf-8"?>
+<file path=ppt/slides/slide21.xml><?xml version="1.0" encoding="utf-8"?>
 <p:sld xmlns:a="http://schemas.openxmlformats.org/drawingml/2006/main" xmlns:r="http://schemas.openxmlformats.org/officeDocument/2006/relationships" xmlns:p="http://schemas.openxmlformats.org/presentationml/2006/main">
   <p:cSld>
     <p:bg>
@@ -5852,36 +7696,6 @@
 </p:sld>
 </file>
 
-<file path=ppt/slides/slide21.xml><?xml version="1.0" encoding="utf-8"?>
-<p:sld xmlns:a="http://schemas.openxmlformats.org/drawingml/2006/main" xmlns:r="http://schemas.openxmlformats.org/officeDocument/2006/relationships" xmlns:p="http://schemas.openxmlformats.org/presentationml/2006/main">
-  <p:cSld>
-    <p:spTree>
-      <p:nvGrpSpPr>
-        <p:cNvPr id="1" name=""/>
-        <p:cNvGrpSpPr/>
-        <p:nvPr/>
-      </p:nvGrpSpPr>
-      <p:grpSpPr>
-        <a:xfrm>
-          <a:off x="0" y="0"/>
-          <a:ext cx="0" cy="0"/>
-          <a:chOff x="0" y="0"/>
-          <a:chExt cx="0" cy="0"/>
-        </a:xfrm>
-      </p:grpSpPr>
-    </p:spTree>
-    <p:extLst>
-      <p:ext uri="{BB962C8B-B14F-4D97-AF65-F5344CB8AC3E}">
-        <p14:creationId xmlns:p14="http://schemas.microsoft.com/office/powerpoint/2010/main" val="4033280782"/>
-      </p:ext>
-    </p:extLst>
-  </p:cSld>
-  <p:clrMapOvr>
-    <a:masterClrMapping/>
-  </p:clrMapOvr>
-</p:sld>
-</file>
-
 <file path=ppt/slides/slide22.xml><?xml version="1.0" encoding="utf-8"?>
 <p:sld xmlns:a="http://schemas.openxmlformats.org/drawingml/2006/main" xmlns:r="http://schemas.openxmlformats.org/officeDocument/2006/relationships" xmlns:p="http://schemas.openxmlformats.org/presentationml/2006/main">
   <p:cSld>
@@ -5943,12 +7757,94 @@
             <p:ph idx="1"/>
           </p:nvPr>
         </p:nvSpPr>
-        <p:spPr/>
-        <p:txBody>
-          <a:bodyPr/>
+        <p:spPr>
+          <a:xfrm>
+            <a:off x="1638300" y="2057400"/>
+            <a:ext cx="10092956" cy="4137259"/>
+          </a:xfrm>
+        </p:spPr>
+        <p:txBody>
+          <a:bodyPr>
+            <a:noAutofit/>
+          </a:bodyPr>
           <a:lstStyle/>
           <a:p>
-            <a:endParaRPr lang="en-US"/>
+            <a:pPr marL="0" indent="0">
+              <a:buNone/>
+            </a:pPr>
+            <a:r>
+              <a:rPr lang="en-US" sz="2800" dirty="0">
+                <a:solidFill>
+                  <a:srgbClr val="0078D7"/>
+                </a:solidFill>
+              </a:rPr>
+              <a:t>Models/</a:t>
+            </a:r>
+            <a:r>
+              <a:rPr lang="en-US" sz="2800" dirty="0" err="1">
+                <a:solidFill>
+                  <a:srgbClr val="0078D7"/>
+                </a:solidFill>
+              </a:rPr>
+              <a:t>AlbumViewModel.en-US.resx</a:t>
+            </a:r>
+            <a:endParaRPr lang="en-US" sz="2800" dirty="0">
+              <a:solidFill>
+                <a:srgbClr val="0078D7"/>
+              </a:solidFill>
+            </a:endParaRPr>
+          </a:p>
+          <a:p>
+            <a:pPr marL="0" indent="0">
+              <a:buNone/>
+            </a:pPr>
+            <a:r>
+              <a:rPr lang="en-US" sz="2800" dirty="0">
+                <a:solidFill>
+                  <a:srgbClr val="0078D7"/>
+                </a:solidFill>
+              </a:rPr>
+              <a:t>Models/ </a:t>
+            </a:r>
+            <a:r>
+              <a:rPr lang="en-US" sz="2800" dirty="0" err="1">
+                <a:solidFill>
+                  <a:srgbClr val="0078D7"/>
+                </a:solidFill>
+              </a:rPr>
+              <a:t>AlbumViewModel.en-US.resx</a:t>
+            </a:r>
+            <a:endParaRPr lang="en-US" sz="2800" dirty="0">
+              <a:solidFill>
+                <a:srgbClr val="0078D7"/>
+              </a:solidFill>
+            </a:endParaRPr>
+          </a:p>
+          <a:p>
+            <a:pPr marL="0" indent="0">
+              <a:buNone/>
+            </a:pPr>
+            <a:r>
+              <a:rPr lang="en-US" sz="2800" dirty="0">
+                <a:solidFill>
+                  <a:srgbClr val="0078D7"/>
+                </a:solidFill>
+              </a:rPr>
+              <a:t>Models/ </a:t>
+            </a:r>
+            <a:r>
+              <a:rPr lang="en-US" sz="2800" dirty="0" err="1">
+                <a:solidFill>
+                  <a:srgbClr val="0078D7"/>
+                </a:solidFill>
+              </a:rPr>
+              <a:t>AlbumViewModel.en-US.resx</a:t>
+            </a:r>
+            <a:endParaRPr lang="en-US" sz="2800" dirty="0">
+              <a:solidFill>
+                <a:srgbClr val="0078D7"/>
+              </a:solidFill>
+            </a:endParaRPr>
           </a:p>
         </p:txBody>
       </p:sp>
@@ -6528,36 +8424,6 @@
           <a:chExt cx="0" cy="0"/>
         </a:xfrm>
       </p:grpSpPr>
-    </p:spTree>
-    <p:extLst>
-      <p:ext uri="{BB962C8B-B14F-4D97-AF65-F5344CB8AC3E}">
-        <p14:creationId xmlns:p14="http://schemas.microsoft.com/office/powerpoint/2010/main" val="3259238677"/>
-      </p:ext>
-    </p:extLst>
-  </p:cSld>
-  <p:clrMapOvr>
-    <a:masterClrMapping/>
-  </p:clrMapOvr>
-</p:sld>
-</file>
-
-<file path=ppt/slides/slide26.xml><?xml version="1.0" encoding="utf-8"?>
-<p:sld xmlns:a="http://schemas.openxmlformats.org/drawingml/2006/main" xmlns:r="http://schemas.openxmlformats.org/officeDocument/2006/relationships" xmlns:p="http://schemas.openxmlformats.org/presentationml/2006/main">
-  <p:cSld>
-    <p:spTree>
-      <p:nvGrpSpPr>
-        <p:cNvPr id="1" name=""/>
-        <p:cNvGrpSpPr/>
-        <p:nvPr/>
-      </p:nvGrpSpPr>
-      <p:grpSpPr>
-        <a:xfrm>
-          <a:off x="0" y="0"/>
-          <a:ext cx="0" cy="0"/>
-          <a:chOff x="0" y="0"/>
-          <a:chExt cx="0" cy="0"/>
-        </a:xfrm>
-      </p:grpSpPr>
       <p:pic>
         <p:nvPicPr>
           <p:cNvPr id="13" name="Picture 12">
@@ -6732,7 +8598,7 @@
 </p:sld>
 </file>
 
-<file path=ppt/slides/slide27.xml><?xml version="1.0" encoding="utf-8"?>
+<file path=ppt/slides/slide26.xml><?xml version="1.0" encoding="utf-8"?>
 <p:sld xmlns:a="http://schemas.openxmlformats.org/drawingml/2006/main" xmlns:r="http://schemas.openxmlformats.org/officeDocument/2006/relationships" xmlns:p="http://schemas.openxmlformats.org/presentationml/2006/main">
   <p:cSld>
     <p:spTree>

</xml_diff>